<commit_message>
app logo and header
</commit_message>
<xml_diff>
--- a/src/assets/img/Presentation2 - application.pptx
+++ b/src/assets/img/Presentation2 - application.pptx
@@ -2,17 +2,21 @@
 <file path=ppt/presentation.xml><?xml version="1.0" encoding="utf-8"?>
 <p:presentation xmlns:a="http://schemas.openxmlformats.org/drawingml/2006/main" xmlns:r="http://schemas.openxmlformats.org/officeDocument/2006/relationships" xmlns:p="http://schemas.openxmlformats.org/presentationml/2006/main" saveSubsetFonts="1">
   <p:sldMasterIdLst>
-    <p:sldMasterId id="2147483679" r:id="rId1"/>
+    <p:sldMasterId id="2147483739" r:id="rId1"/>
   </p:sldMasterIdLst>
+  <p:handoutMasterIdLst>
+    <p:handoutMasterId r:id="rId5"/>
+  </p:handoutMasterIdLst>
   <p:sldIdLst>
     <p:sldId id="257" r:id="rId2"/>
-    <p:sldId id="259" r:id="rId3"/>
+    <p:sldId id="260" r:id="rId3"/>
+    <p:sldId id="259" r:id="rId4"/>
   </p:sldIdLst>
   <p:sldSz cx="12192000" cy="6858000"/>
   <p:notesSz cx="6858000" cy="9144000"/>
   <p:defaultTextStyle>
     <a:defPPr>
-      <a:defRPr lang="LID4096"/>
+      <a:defRPr lang="en-IL"/>
     </a:defPPr>
     <a:lvl1pPr marL="0" algn="l" defTabSz="914400" rtl="0" eaLnBrk="1" latinLnBrk="0" hangingPunct="1">
       <a:defRPr sz="1800" kern="1200">
@@ -153,7 +157,7 @@
               <a:cs typeface="+mn-cs"/>
             </a:defRPr>
           </a:pPr>
-          <a:endParaRPr lang="LID4096"/>
+          <a:endParaRPr lang="en-IL"/>
         </a:p>
       </c:txPr>
     </c:title>
@@ -349,7 +353,7 @@
               <a:cs typeface="+mn-cs"/>
             </a:defRPr>
           </a:pPr>
-          <a:endParaRPr lang="LID4096"/>
+          <a:endParaRPr lang="en-IL"/>
         </a:p>
       </c:txPr>
     </c:legend>
@@ -378,7 +382,7 @@
       <a:pPr>
         <a:defRPr/>
       </a:pPr>
-      <a:endParaRPr lang="LID4096"/>
+      <a:endParaRPr lang="en-IL"/>
     </a:p>
   </c:txPr>
   <c:externalData r:id="rId3">
@@ -946,6 +950,195 @@
 </cs:chartStyle>
 </file>
 
+<file path=ppt/handoutMasters/handoutMaster1.xml><?xml version="1.0" encoding="utf-8"?>
+<p:handoutMaster xmlns:a="http://schemas.openxmlformats.org/drawingml/2006/main" xmlns:r="http://schemas.openxmlformats.org/officeDocument/2006/relationships" xmlns:p="http://schemas.openxmlformats.org/presentationml/2006/main">
+  <p:cSld>
+    <p:bg>
+      <p:bgRef idx="1001">
+        <a:schemeClr val="bg1"/>
+      </p:bgRef>
+    </p:bg>
+    <p:spTree>
+      <p:nvGrpSpPr>
+        <p:cNvPr id="1" name=""/>
+        <p:cNvGrpSpPr/>
+        <p:nvPr/>
+      </p:nvGrpSpPr>
+      <p:grpSpPr>
+        <a:xfrm>
+          <a:off x="0" y="0"/>
+          <a:ext cx="0" cy="0"/>
+          <a:chOff x="0" y="0"/>
+          <a:chExt cx="0" cy="0"/>
+        </a:xfrm>
+      </p:grpSpPr>
+      <p:sp>
+        <p:nvSpPr>
+          <p:cNvPr id="2" name="Header Placeholder 1">
+            <a:extLst>
+              <a:ext uri="{FF2B5EF4-FFF2-40B4-BE49-F238E27FC236}">
+                <a16:creationId xmlns:a16="http://schemas.microsoft.com/office/drawing/2014/main" id="{A871EEE4-C026-47BC-9120-07012CCCF35E}"/>
+              </a:ext>
+            </a:extLst>
+          </p:cNvPr>
+          <p:cNvSpPr>
+            <a:spLocks noGrp="1"/>
+          </p:cNvSpPr>
+          <p:nvPr>
+            <p:ph type="hdr" sz="quarter"/>
+          </p:nvPr>
+        </p:nvSpPr>
+        <p:spPr>
+          <a:xfrm>
+            <a:off x="0" y="0"/>
+            <a:ext cx="2971800" cy="458788"/>
+          </a:xfrm>
+          <a:prstGeom prst="rect">
+            <a:avLst/>
+          </a:prstGeom>
+        </p:spPr>
+        <p:txBody>
+          <a:bodyPr vert="horz" lIns="91440" tIns="45720" rIns="91440" bIns="45720" rtlCol="0"/>
+          <a:lstStyle>
+            <a:lvl1pPr algn="l">
+              <a:defRPr sz="1200"/>
+            </a:lvl1pPr>
+          </a:lstStyle>
+          <a:p>
+            <a:endParaRPr lang="en-IL"/>
+          </a:p>
+        </p:txBody>
+      </p:sp>
+      <p:sp>
+        <p:nvSpPr>
+          <p:cNvPr id="3" name="Date Placeholder 2">
+            <a:extLst>
+              <a:ext uri="{FF2B5EF4-FFF2-40B4-BE49-F238E27FC236}">
+                <a16:creationId xmlns:a16="http://schemas.microsoft.com/office/drawing/2014/main" id="{39CC79B9-0740-4AD0-BDE6-27985FE1EB25}"/>
+              </a:ext>
+            </a:extLst>
+          </p:cNvPr>
+          <p:cNvSpPr>
+            <a:spLocks noGrp="1"/>
+          </p:cNvSpPr>
+          <p:nvPr>
+            <p:ph type="dt" sz="quarter" idx="1"/>
+          </p:nvPr>
+        </p:nvSpPr>
+        <p:spPr>
+          <a:xfrm>
+            <a:off x="3884613" y="0"/>
+            <a:ext cx="2971800" cy="458788"/>
+          </a:xfrm>
+          <a:prstGeom prst="rect">
+            <a:avLst/>
+          </a:prstGeom>
+        </p:spPr>
+        <p:txBody>
+          <a:bodyPr vert="horz" lIns="91440" tIns="45720" rIns="91440" bIns="45720" rtlCol="0"/>
+          <a:lstStyle>
+            <a:lvl1pPr algn="r">
+              <a:defRPr sz="1200"/>
+            </a:lvl1pPr>
+          </a:lstStyle>
+          <a:p>
+            <a:fld id="{1E9FC649-3BB3-4B41-9BF5-ECDA9A510878}" type="datetimeFigureOut">
+              <a:rPr lang="en-IL" smtClean="0"/>
+              <a:t>13/09/2020</a:t>
+            </a:fld>
+            <a:endParaRPr lang="en-IL"/>
+          </a:p>
+        </p:txBody>
+      </p:sp>
+      <p:sp>
+        <p:nvSpPr>
+          <p:cNvPr id="4" name="Footer Placeholder 3">
+            <a:extLst>
+              <a:ext uri="{FF2B5EF4-FFF2-40B4-BE49-F238E27FC236}">
+                <a16:creationId xmlns:a16="http://schemas.microsoft.com/office/drawing/2014/main" id="{D7D17B36-D57F-45D0-A81D-4CE3337546BC}"/>
+              </a:ext>
+            </a:extLst>
+          </p:cNvPr>
+          <p:cNvSpPr>
+            <a:spLocks noGrp="1"/>
+          </p:cNvSpPr>
+          <p:nvPr>
+            <p:ph type="ftr" sz="quarter" idx="2"/>
+          </p:nvPr>
+        </p:nvSpPr>
+        <p:spPr>
+          <a:xfrm>
+            <a:off x="0" y="8685213"/>
+            <a:ext cx="2971800" cy="458787"/>
+          </a:xfrm>
+          <a:prstGeom prst="rect">
+            <a:avLst/>
+          </a:prstGeom>
+        </p:spPr>
+        <p:txBody>
+          <a:bodyPr vert="horz" lIns="91440" tIns="45720" rIns="91440" bIns="45720" rtlCol="0" anchor="b"/>
+          <a:lstStyle>
+            <a:lvl1pPr algn="l">
+              <a:defRPr sz="1200"/>
+            </a:lvl1pPr>
+          </a:lstStyle>
+          <a:p>
+            <a:endParaRPr lang="en-IL"/>
+          </a:p>
+        </p:txBody>
+      </p:sp>
+      <p:sp>
+        <p:nvSpPr>
+          <p:cNvPr id="5" name="Slide Number Placeholder 4">
+            <a:extLst>
+              <a:ext uri="{FF2B5EF4-FFF2-40B4-BE49-F238E27FC236}">
+                <a16:creationId xmlns:a16="http://schemas.microsoft.com/office/drawing/2014/main" id="{22305345-70A7-4E3A-A797-E0087ABA66FC}"/>
+              </a:ext>
+            </a:extLst>
+          </p:cNvPr>
+          <p:cNvSpPr>
+            <a:spLocks noGrp="1"/>
+          </p:cNvSpPr>
+          <p:nvPr>
+            <p:ph type="sldNum" sz="quarter" idx="3"/>
+          </p:nvPr>
+        </p:nvSpPr>
+        <p:spPr>
+          <a:xfrm>
+            <a:off x="3884613" y="8685213"/>
+            <a:ext cx="2971800" cy="458787"/>
+          </a:xfrm>
+          <a:prstGeom prst="rect">
+            <a:avLst/>
+          </a:prstGeom>
+        </p:spPr>
+        <p:txBody>
+          <a:bodyPr vert="horz" lIns="91440" tIns="45720" rIns="91440" bIns="45720" rtlCol="0" anchor="b"/>
+          <a:lstStyle>
+            <a:lvl1pPr algn="r">
+              <a:defRPr sz="1200"/>
+            </a:lvl1pPr>
+          </a:lstStyle>
+          <a:p>
+            <a:fld id="{4D671056-81A0-49C8-A799-675CE86D5F80}" type="slidenum">
+              <a:rPr lang="en-IL" smtClean="0"/>
+              <a:t>‹#›</a:t>
+            </a:fld>
+            <a:endParaRPr lang="en-IL"/>
+          </a:p>
+        </p:txBody>
+      </p:sp>
+    </p:spTree>
+    <p:extLst>
+      <p:ext uri="{BB962C8B-B14F-4D97-AF65-F5344CB8AC3E}">
+        <p14:creationId xmlns:p14="http://schemas.microsoft.com/office/powerpoint/2010/main" val="512445155"/>
+      </p:ext>
+    </p:extLst>
+  </p:cSld>
+  <p:clrMap bg1="lt1" tx1="dk1" bg2="lt2" tx2="dk2" accent1="accent1" accent2="accent2" accent3="accent3" accent4="accent4" accent5="accent5" accent6="accent6" hlink="hlink" folHlink="folHlink"/>
+</p:handoutMaster>
+</file>
+
 <file path=ppt/slideLayouts/slideLayout1.xml><?xml version="1.0" encoding="utf-8"?>
 <p:sldLayout xmlns:a="http://schemas.openxmlformats.org/drawingml/2006/main" xmlns:r="http://schemas.openxmlformats.org/officeDocument/2006/relationships" xmlns:p="http://schemas.openxmlformats.org/presentationml/2006/main" type="title" preserve="1">
   <p:cSld name="Title Slide">
@@ -968,7 +1161,7 @@
           <p:cNvPr id="2" name="Title 1">
             <a:extLst>
               <a:ext uri="{FF2B5EF4-FFF2-40B4-BE49-F238E27FC236}">
-                <a16:creationId xmlns:a16="http://schemas.microsoft.com/office/drawing/2014/main" id="{918EC3DF-D630-4B73-8602-871D5B58076E}"/>
+                <a16:creationId xmlns:a16="http://schemas.microsoft.com/office/drawing/2014/main" id="{95102ED0-59D2-4CEE-9B95-165160C0DBFE}"/>
               </a:ext>
             </a:extLst>
           </p:cNvPr>
@@ -997,7 +1190,7 @@
               <a:rPr lang="en-US"/>
               <a:t>Click to edit Master title style</a:t>
             </a:r>
-            <a:endParaRPr lang="LID4096"/>
+            <a:endParaRPr lang="en-IL"/>
           </a:p>
         </p:txBody>
       </p:sp>
@@ -1006,7 +1199,7 @@
           <p:cNvPr id="3" name="Subtitle 2">
             <a:extLst>
               <a:ext uri="{FF2B5EF4-FFF2-40B4-BE49-F238E27FC236}">
-                <a16:creationId xmlns:a16="http://schemas.microsoft.com/office/drawing/2014/main" id="{C4D1E2D3-8ADB-48B1-8B3A-8C6FADC7F7D5}"/>
+                <a16:creationId xmlns:a16="http://schemas.microsoft.com/office/drawing/2014/main" id="{5EB25682-CECF-4908-AEC6-C9DD47F4BB05}"/>
               </a:ext>
             </a:extLst>
           </p:cNvPr>
@@ -1068,7 +1261,7 @@
               <a:rPr lang="en-US"/>
               <a:t>Click to edit Master subtitle style</a:t>
             </a:r>
-            <a:endParaRPr lang="LID4096"/>
+            <a:endParaRPr lang="en-IL"/>
           </a:p>
         </p:txBody>
       </p:sp>
@@ -1077,7 +1270,7 @@
           <p:cNvPr id="4" name="Date Placeholder 3">
             <a:extLst>
               <a:ext uri="{FF2B5EF4-FFF2-40B4-BE49-F238E27FC236}">
-                <a16:creationId xmlns:a16="http://schemas.microsoft.com/office/drawing/2014/main" id="{19F3C24C-0F11-4A51-8782-6DD6114B89E7}"/>
+                <a16:creationId xmlns:a16="http://schemas.microsoft.com/office/drawing/2014/main" id="{935ADED4-A466-493C-BC92-E86E5B0E05D7}"/>
               </a:ext>
             </a:extLst>
           </p:cNvPr>
@@ -1095,7 +1288,7 @@
           <a:p>
             <a:fld id="{30976E16-775E-4B4F-9FA1-C4EE629F34C1}" type="datetimeFigureOut">
               <a:rPr lang="en-IL" smtClean="0"/>
-              <a:t>09/09/2020</a:t>
+              <a:t>13/09/2020</a:t>
             </a:fld>
             <a:endParaRPr lang="en-IL"/>
           </a:p>
@@ -1106,7 +1299,7 @@
           <p:cNvPr id="5" name="Footer Placeholder 4">
             <a:extLst>
               <a:ext uri="{FF2B5EF4-FFF2-40B4-BE49-F238E27FC236}">
-                <a16:creationId xmlns:a16="http://schemas.microsoft.com/office/drawing/2014/main" id="{D0C466EA-CD01-428B-8C3F-7089A0DDEA4E}"/>
+                <a16:creationId xmlns:a16="http://schemas.microsoft.com/office/drawing/2014/main" id="{C2DE12BE-D791-4915-979B-096B0E1821FB}"/>
               </a:ext>
             </a:extLst>
           </p:cNvPr>
@@ -1131,7 +1324,7 @@
           <p:cNvPr id="6" name="Slide Number Placeholder 5">
             <a:extLst>
               <a:ext uri="{FF2B5EF4-FFF2-40B4-BE49-F238E27FC236}">
-                <a16:creationId xmlns:a16="http://schemas.microsoft.com/office/drawing/2014/main" id="{036D672B-C3C3-4841-B812-57EC979467D7}"/>
+                <a16:creationId xmlns:a16="http://schemas.microsoft.com/office/drawing/2014/main" id="{302D69D0-43E2-4157-8A17-DF24143BC45E}"/>
               </a:ext>
             </a:extLst>
           </p:cNvPr>
@@ -1158,7 +1351,7 @@
     </p:spTree>
     <p:extLst>
       <p:ext uri="{BB962C8B-B14F-4D97-AF65-F5344CB8AC3E}">
-        <p14:creationId xmlns:p14="http://schemas.microsoft.com/office/powerpoint/2010/main" val="3032050190"/>
+        <p14:creationId xmlns:p14="http://schemas.microsoft.com/office/powerpoint/2010/main" val="2720854431"/>
       </p:ext>
     </p:extLst>
   </p:cSld>
@@ -1190,7 +1383,7 @@
           <p:cNvPr id="2" name="Title 1">
             <a:extLst>
               <a:ext uri="{FF2B5EF4-FFF2-40B4-BE49-F238E27FC236}">
-                <a16:creationId xmlns:a16="http://schemas.microsoft.com/office/drawing/2014/main" id="{3E33C301-C04A-4309-80DC-C5C1A6B5F9E7}"/>
+                <a16:creationId xmlns:a16="http://schemas.microsoft.com/office/drawing/2014/main" id="{553193E7-8495-4C99-9B34-AF015C5F4BCF}"/>
               </a:ext>
             </a:extLst>
           </p:cNvPr>
@@ -1210,7 +1403,7 @@
               <a:rPr lang="en-US"/>
               <a:t>Click to edit Master title style</a:t>
             </a:r>
-            <a:endParaRPr lang="LID4096"/>
+            <a:endParaRPr lang="en-IL"/>
           </a:p>
         </p:txBody>
       </p:sp>
@@ -1219,7 +1412,7 @@
           <p:cNvPr id="3" name="Vertical Text Placeholder 2">
             <a:extLst>
               <a:ext uri="{FF2B5EF4-FFF2-40B4-BE49-F238E27FC236}">
-                <a16:creationId xmlns:a16="http://schemas.microsoft.com/office/drawing/2014/main" id="{0A0DE8F3-2654-490E-A5A7-9970321ECD36}"/>
+                <a16:creationId xmlns:a16="http://schemas.microsoft.com/office/drawing/2014/main" id="{24F888C2-B70A-49FB-9B90-980A4BB7D518}"/>
               </a:ext>
             </a:extLst>
           </p:cNvPr>
@@ -1268,7 +1461,7 @@
               <a:rPr lang="en-US"/>
               <a:t>Fifth level</a:t>
             </a:r>
-            <a:endParaRPr lang="LID4096"/>
+            <a:endParaRPr lang="en-IL"/>
           </a:p>
         </p:txBody>
       </p:sp>
@@ -1277,7 +1470,7 @@
           <p:cNvPr id="4" name="Date Placeholder 3">
             <a:extLst>
               <a:ext uri="{FF2B5EF4-FFF2-40B4-BE49-F238E27FC236}">
-                <a16:creationId xmlns:a16="http://schemas.microsoft.com/office/drawing/2014/main" id="{5DD1CC06-17D0-4218-940A-8F3304A6A249}"/>
+                <a16:creationId xmlns:a16="http://schemas.microsoft.com/office/drawing/2014/main" id="{7F224303-8A97-4F78-A676-1B618CF91B97}"/>
               </a:ext>
             </a:extLst>
           </p:cNvPr>
@@ -1295,7 +1488,7 @@
           <a:p>
             <a:fld id="{30976E16-775E-4B4F-9FA1-C4EE629F34C1}" type="datetimeFigureOut">
               <a:rPr lang="en-IL" smtClean="0"/>
-              <a:t>09/09/2020</a:t>
+              <a:t>13/09/2020</a:t>
             </a:fld>
             <a:endParaRPr lang="en-IL"/>
           </a:p>
@@ -1306,7 +1499,7 @@
           <p:cNvPr id="5" name="Footer Placeholder 4">
             <a:extLst>
               <a:ext uri="{FF2B5EF4-FFF2-40B4-BE49-F238E27FC236}">
-                <a16:creationId xmlns:a16="http://schemas.microsoft.com/office/drawing/2014/main" id="{9EEBDB2D-5A2B-4A4C-8CD3-B2DE15CD3973}"/>
+                <a16:creationId xmlns:a16="http://schemas.microsoft.com/office/drawing/2014/main" id="{5DA8A1E2-1921-46BA-8DCA-DD247D85179E}"/>
               </a:ext>
             </a:extLst>
           </p:cNvPr>
@@ -1331,7 +1524,7 @@
           <p:cNvPr id="6" name="Slide Number Placeholder 5">
             <a:extLst>
               <a:ext uri="{FF2B5EF4-FFF2-40B4-BE49-F238E27FC236}">
-                <a16:creationId xmlns:a16="http://schemas.microsoft.com/office/drawing/2014/main" id="{479237FF-B9CD-459C-A6F7-8E04D455B227}"/>
+                <a16:creationId xmlns:a16="http://schemas.microsoft.com/office/drawing/2014/main" id="{025BC0AC-EC0F-49BC-B23D-38FE3F1481B3}"/>
               </a:ext>
             </a:extLst>
           </p:cNvPr>
@@ -1358,7 +1551,7 @@
     </p:spTree>
     <p:extLst>
       <p:ext uri="{BB962C8B-B14F-4D97-AF65-F5344CB8AC3E}">
-        <p14:creationId xmlns:p14="http://schemas.microsoft.com/office/powerpoint/2010/main" val="2994867477"/>
+        <p14:creationId xmlns:p14="http://schemas.microsoft.com/office/powerpoint/2010/main" val="1745003162"/>
       </p:ext>
     </p:extLst>
   </p:cSld>
@@ -1390,7 +1583,7 @@
           <p:cNvPr id="2" name="Vertical Title 1">
             <a:extLst>
               <a:ext uri="{FF2B5EF4-FFF2-40B4-BE49-F238E27FC236}">
-                <a16:creationId xmlns:a16="http://schemas.microsoft.com/office/drawing/2014/main" id="{6F1EC635-CE8D-4894-814C-0C82A2713C90}"/>
+                <a16:creationId xmlns:a16="http://schemas.microsoft.com/office/drawing/2014/main" id="{ACF84DC2-9C71-4FD3-AEA5-8C87BB53F3A3}"/>
               </a:ext>
             </a:extLst>
           </p:cNvPr>
@@ -1415,7 +1608,7 @@
               <a:rPr lang="en-US"/>
               <a:t>Click to edit Master title style</a:t>
             </a:r>
-            <a:endParaRPr lang="LID4096"/>
+            <a:endParaRPr lang="en-IL"/>
           </a:p>
         </p:txBody>
       </p:sp>
@@ -1424,7 +1617,7 @@
           <p:cNvPr id="3" name="Vertical Text Placeholder 2">
             <a:extLst>
               <a:ext uri="{FF2B5EF4-FFF2-40B4-BE49-F238E27FC236}">
-                <a16:creationId xmlns:a16="http://schemas.microsoft.com/office/drawing/2014/main" id="{F22AC49A-D2EC-45EB-8CCB-0EC8F20C0B66}"/>
+                <a16:creationId xmlns:a16="http://schemas.microsoft.com/office/drawing/2014/main" id="{9F6FFCC9-25D1-4AEA-A29E-F43B2F84834D}"/>
               </a:ext>
             </a:extLst>
           </p:cNvPr>
@@ -1478,7 +1671,7 @@
               <a:rPr lang="en-US"/>
               <a:t>Fifth level</a:t>
             </a:r>
-            <a:endParaRPr lang="LID4096"/>
+            <a:endParaRPr lang="en-IL"/>
           </a:p>
         </p:txBody>
       </p:sp>
@@ -1487,7 +1680,7 @@
           <p:cNvPr id="4" name="Date Placeholder 3">
             <a:extLst>
               <a:ext uri="{FF2B5EF4-FFF2-40B4-BE49-F238E27FC236}">
-                <a16:creationId xmlns:a16="http://schemas.microsoft.com/office/drawing/2014/main" id="{A1205788-F004-41A2-BB5B-0C4E587F58FA}"/>
+                <a16:creationId xmlns:a16="http://schemas.microsoft.com/office/drawing/2014/main" id="{D6C4825A-2E5A-4521-A0ED-A01A2B344AB7}"/>
               </a:ext>
             </a:extLst>
           </p:cNvPr>
@@ -1505,7 +1698,7 @@
           <a:p>
             <a:fld id="{30976E16-775E-4B4F-9FA1-C4EE629F34C1}" type="datetimeFigureOut">
               <a:rPr lang="en-IL" smtClean="0"/>
-              <a:t>09/09/2020</a:t>
+              <a:t>13/09/2020</a:t>
             </a:fld>
             <a:endParaRPr lang="en-IL"/>
           </a:p>
@@ -1516,7 +1709,7 @@
           <p:cNvPr id="5" name="Footer Placeholder 4">
             <a:extLst>
               <a:ext uri="{FF2B5EF4-FFF2-40B4-BE49-F238E27FC236}">
-                <a16:creationId xmlns:a16="http://schemas.microsoft.com/office/drawing/2014/main" id="{089430B8-F13E-49F2-80BA-387ABED7C160}"/>
+                <a16:creationId xmlns:a16="http://schemas.microsoft.com/office/drawing/2014/main" id="{8FA63966-7B0A-4C55-9591-54469FC51ED7}"/>
               </a:ext>
             </a:extLst>
           </p:cNvPr>
@@ -1541,7 +1734,7 @@
           <p:cNvPr id="6" name="Slide Number Placeholder 5">
             <a:extLst>
               <a:ext uri="{FF2B5EF4-FFF2-40B4-BE49-F238E27FC236}">
-                <a16:creationId xmlns:a16="http://schemas.microsoft.com/office/drawing/2014/main" id="{6D6F1BE5-6A1E-4FFC-AE01-7EE3BA0B5B0B}"/>
+                <a16:creationId xmlns:a16="http://schemas.microsoft.com/office/drawing/2014/main" id="{82C8C23D-D717-45AD-9695-FFFE3C73C882}"/>
               </a:ext>
             </a:extLst>
           </p:cNvPr>
@@ -1568,7 +1761,7 @@
     </p:spTree>
     <p:extLst>
       <p:ext uri="{BB962C8B-B14F-4D97-AF65-F5344CB8AC3E}">
-        <p14:creationId xmlns:p14="http://schemas.microsoft.com/office/powerpoint/2010/main" val="893785382"/>
+        <p14:creationId xmlns:p14="http://schemas.microsoft.com/office/powerpoint/2010/main" val="1634460292"/>
       </p:ext>
     </p:extLst>
   </p:cSld>
@@ -1600,7 +1793,7 @@
           <p:cNvPr id="2" name="Title 1">
             <a:extLst>
               <a:ext uri="{FF2B5EF4-FFF2-40B4-BE49-F238E27FC236}">
-                <a16:creationId xmlns:a16="http://schemas.microsoft.com/office/drawing/2014/main" id="{A3E287AB-F6D8-4DA8-9C87-360DE6D50C10}"/>
+                <a16:creationId xmlns:a16="http://schemas.microsoft.com/office/drawing/2014/main" id="{09A57EE8-8D2F-438B-91E1-D91A29AFA1EB}"/>
               </a:ext>
             </a:extLst>
           </p:cNvPr>
@@ -1620,7 +1813,7 @@
               <a:rPr lang="en-US"/>
               <a:t>Click to edit Master title style</a:t>
             </a:r>
-            <a:endParaRPr lang="LID4096"/>
+            <a:endParaRPr lang="en-IL"/>
           </a:p>
         </p:txBody>
       </p:sp>
@@ -1629,7 +1822,7 @@
           <p:cNvPr id="3" name="Content Placeholder 2">
             <a:extLst>
               <a:ext uri="{FF2B5EF4-FFF2-40B4-BE49-F238E27FC236}">
-                <a16:creationId xmlns:a16="http://schemas.microsoft.com/office/drawing/2014/main" id="{D9DB6987-017E-4C39-BDA3-80A5AEA3CEF9}"/>
+                <a16:creationId xmlns:a16="http://schemas.microsoft.com/office/drawing/2014/main" id="{DEEB4479-773E-4CBB-BE0C-529827BADFA7}"/>
               </a:ext>
             </a:extLst>
           </p:cNvPr>
@@ -1678,7 +1871,7 @@
               <a:rPr lang="en-US"/>
               <a:t>Fifth level</a:t>
             </a:r>
-            <a:endParaRPr lang="LID4096"/>
+            <a:endParaRPr lang="en-IL"/>
           </a:p>
         </p:txBody>
       </p:sp>
@@ -1687,7 +1880,7 @@
           <p:cNvPr id="4" name="Date Placeholder 3">
             <a:extLst>
               <a:ext uri="{FF2B5EF4-FFF2-40B4-BE49-F238E27FC236}">
-                <a16:creationId xmlns:a16="http://schemas.microsoft.com/office/drawing/2014/main" id="{3B6C3122-7AD6-4444-B8C3-5D0FB2FD8381}"/>
+                <a16:creationId xmlns:a16="http://schemas.microsoft.com/office/drawing/2014/main" id="{0ED12012-1F43-46EE-9793-F82E35537161}"/>
               </a:ext>
             </a:extLst>
           </p:cNvPr>
@@ -1705,7 +1898,7 @@
           <a:p>
             <a:fld id="{30976E16-775E-4B4F-9FA1-C4EE629F34C1}" type="datetimeFigureOut">
               <a:rPr lang="en-IL" smtClean="0"/>
-              <a:t>09/09/2020</a:t>
+              <a:t>13/09/2020</a:t>
             </a:fld>
             <a:endParaRPr lang="en-IL"/>
           </a:p>
@@ -1716,7 +1909,7 @@
           <p:cNvPr id="5" name="Footer Placeholder 4">
             <a:extLst>
               <a:ext uri="{FF2B5EF4-FFF2-40B4-BE49-F238E27FC236}">
-                <a16:creationId xmlns:a16="http://schemas.microsoft.com/office/drawing/2014/main" id="{DEF94B14-AD25-4A51-AB46-C575E672B41D}"/>
+                <a16:creationId xmlns:a16="http://schemas.microsoft.com/office/drawing/2014/main" id="{1F54762E-83F0-4648-831D-B11BBE4C304E}"/>
               </a:ext>
             </a:extLst>
           </p:cNvPr>
@@ -1741,7 +1934,7 @@
           <p:cNvPr id="6" name="Slide Number Placeholder 5">
             <a:extLst>
               <a:ext uri="{FF2B5EF4-FFF2-40B4-BE49-F238E27FC236}">
-                <a16:creationId xmlns:a16="http://schemas.microsoft.com/office/drawing/2014/main" id="{3F682511-76CF-4F7A-8066-231FF5116B2E}"/>
+                <a16:creationId xmlns:a16="http://schemas.microsoft.com/office/drawing/2014/main" id="{F4C08EA6-516A-4990-96D5-25093A6713B5}"/>
               </a:ext>
             </a:extLst>
           </p:cNvPr>
@@ -1768,7 +1961,7 @@
     </p:spTree>
     <p:extLst>
       <p:ext uri="{BB962C8B-B14F-4D97-AF65-F5344CB8AC3E}">
-        <p14:creationId xmlns:p14="http://schemas.microsoft.com/office/powerpoint/2010/main" val="2529648191"/>
+        <p14:creationId xmlns:p14="http://schemas.microsoft.com/office/powerpoint/2010/main" val="796281459"/>
       </p:ext>
     </p:extLst>
   </p:cSld>
@@ -1800,7 +1993,7 @@
           <p:cNvPr id="2" name="Title 1">
             <a:extLst>
               <a:ext uri="{FF2B5EF4-FFF2-40B4-BE49-F238E27FC236}">
-                <a16:creationId xmlns:a16="http://schemas.microsoft.com/office/drawing/2014/main" id="{ABAB73B3-51B7-4DC7-82CB-36B04F18396E}"/>
+                <a16:creationId xmlns:a16="http://schemas.microsoft.com/office/drawing/2014/main" id="{60701AB6-F104-48B5-A6A3-5E3679892F43}"/>
               </a:ext>
             </a:extLst>
           </p:cNvPr>
@@ -1829,7 +2022,7 @@
               <a:rPr lang="en-US"/>
               <a:t>Click to edit Master title style</a:t>
             </a:r>
-            <a:endParaRPr lang="LID4096"/>
+            <a:endParaRPr lang="en-IL"/>
           </a:p>
         </p:txBody>
       </p:sp>
@@ -1838,7 +2031,7 @@
           <p:cNvPr id="3" name="Text Placeholder 2">
             <a:extLst>
               <a:ext uri="{FF2B5EF4-FFF2-40B4-BE49-F238E27FC236}">
-                <a16:creationId xmlns:a16="http://schemas.microsoft.com/office/drawing/2014/main" id="{5A4CC5AD-8A23-4D3A-AEA5-E0670DB82DCB}"/>
+                <a16:creationId xmlns:a16="http://schemas.microsoft.com/office/drawing/2014/main" id="{62394FF6-4142-4185-91A4-02F1EEB93C3B}"/>
               </a:ext>
             </a:extLst>
           </p:cNvPr>
@@ -1963,7 +2156,7 @@
           <p:cNvPr id="4" name="Date Placeholder 3">
             <a:extLst>
               <a:ext uri="{FF2B5EF4-FFF2-40B4-BE49-F238E27FC236}">
-                <a16:creationId xmlns:a16="http://schemas.microsoft.com/office/drawing/2014/main" id="{5577BDE4-C86D-49D2-9D37-1F68832437FD}"/>
+                <a16:creationId xmlns:a16="http://schemas.microsoft.com/office/drawing/2014/main" id="{E75AE5E5-CBC2-45DE-B23B-BF9754ED3E71}"/>
               </a:ext>
             </a:extLst>
           </p:cNvPr>
@@ -1981,7 +2174,7 @@
           <a:p>
             <a:fld id="{30976E16-775E-4B4F-9FA1-C4EE629F34C1}" type="datetimeFigureOut">
               <a:rPr lang="en-IL" smtClean="0"/>
-              <a:t>09/09/2020</a:t>
+              <a:t>13/09/2020</a:t>
             </a:fld>
             <a:endParaRPr lang="en-IL"/>
           </a:p>
@@ -1992,7 +2185,7 @@
           <p:cNvPr id="5" name="Footer Placeholder 4">
             <a:extLst>
               <a:ext uri="{FF2B5EF4-FFF2-40B4-BE49-F238E27FC236}">
-                <a16:creationId xmlns:a16="http://schemas.microsoft.com/office/drawing/2014/main" id="{B878C9F0-036E-4D84-9772-F8C09BD03869}"/>
+                <a16:creationId xmlns:a16="http://schemas.microsoft.com/office/drawing/2014/main" id="{ED78003A-B491-4227-A59F-47A7D0675069}"/>
               </a:ext>
             </a:extLst>
           </p:cNvPr>
@@ -2017,7 +2210,7 @@
           <p:cNvPr id="6" name="Slide Number Placeholder 5">
             <a:extLst>
               <a:ext uri="{FF2B5EF4-FFF2-40B4-BE49-F238E27FC236}">
-                <a16:creationId xmlns:a16="http://schemas.microsoft.com/office/drawing/2014/main" id="{1AED49D0-3764-4746-A282-F6D2F6E866FE}"/>
+                <a16:creationId xmlns:a16="http://schemas.microsoft.com/office/drawing/2014/main" id="{81D6E914-7FD8-4C36-8F2E-D34584F9D352}"/>
               </a:ext>
             </a:extLst>
           </p:cNvPr>
@@ -2044,7 +2237,7 @@
     </p:spTree>
     <p:extLst>
       <p:ext uri="{BB962C8B-B14F-4D97-AF65-F5344CB8AC3E}">
-        <p14:creationId xmlns:p14="http://schemas.microsoft.com/office/powerpoint/2010/main" val="3265272104"/>
+        <p14:creationId xmlns:p14="http://schemas.microsoft.com/office/powerpoint/2010/main" val="1342378723"/>
       </p:ext>
     </p:extLst>
   </p:cSld>
@@ -2076,7 +2269,7 @@
           <p:cNvPr id="2" name="Title 1">
             <a:extLst>
               <a:ext uri="{FF2B5EF4-FFF2-40B4-BE49-F238E27FC236}">
-                <a16:creationId xmlns:a16="http://schemas.microsoft.com/office/drawing/2014/main" id="{C5A6BF1B-673D-4DDC-8A24-85E6F7B941EE}"/>
+                <a16:creationId xmlns:a16="http://schemas.microsoft.com/office/drawing/2014/main" id="{EEF6EF76-6AAA-45DE-982B-563AE110E9DD}"/>
               </a:ext>
             </a:extLst>
           </p:cNvPr>
@@ -2096,7 +2289,7 @@
               <a:rPr lang="en-US"/>
               <a:t>Click to edit Master title style</a:t>
             </a:r>
-            <a:endParaRPr lang="LID4096"/>
+            <a:endParaRPr lang="en-IL"/>
           </a:p>
         </p:txBody>
       </p:sp>
@@ -2105,7 +2298,7 @@
           <p:cNvPr id="3" name="Content Placeholder 2">
             <a:extLst>
               <a:ext uri="{FF2B5EF4-FFF2-40B4-BE49-F238E27FC236}">
-                <a16:creationId xmlns:a16="http://schemas.microsoft.com/office/drawing/2014/main" id="{E243CF82-D9CC-4960-BB30-54139A7B6231}"/>
+                <a16:creationId xmlns:a16="http://schemas.microsoft.com/office/drawing/2014/main" id="{5692C0B6-FA24-4FCF-8F3C-7614C32F27BB}"/>
               </a:ext>
             </a:extLst>
           </p:cNvPr>
@@ -2159,7 +2352,7 @@
               <a:rPr lang="en-US"/>
               <a:t>Fifth level</a:t>
             </a:r>
-            <a:endParaRPr lang="LID4096"/>
+            <a:endParaRPr lang="en-IL"/>
           </a:p>
         </p:txBody>
       </p:sp>
@@ -2168,7 +2361,7 @@
           <p:cNvPr id="4" name="Content Placeholder 3">
             <a:extLst>
               <a:ext uri="{FF2B5EF4-FFF2-40B4-BE49-F238E27FC236}">
-                <a16:creationId xmlns:a16="http://schemas.microsoft.com/office/drawing/2014/main" id="{E6A8A475-5388-45CF-90F0-B93C53D774E4}"/>
+                <a16:creationId xmlns:a16="http://schemas.microsoft.com/office/drawing/2014/main" id="{F6AD9BC8-3AD9-4CCB-B9A6-02ACC857527E}"/>
               </a:ext>
             </a:extLst>
           </p:cNvPr>
@@ -2222,7 +2415,7 @@
               <a:rPr lang="en-US"/>
               <a:t>Fifth level</a:t>
             </a:r>
-            <a:endParaRPr lang="LID4096"/>
+            <a:endParaRPr lang="en-IL"/>
           </a:p>
         </p:txBody>
       </p:sp>
@@ -2231,7 +2424,7 @@
           <p:cNvPr id="5" name="Date Placeholder 4">
             <a:extLst>
               <a:ext uri="{FF2B5EF4-FFF2-40B4-BE49-F238E27FC236}">
-                <a16:creationId xmlns:a16="http://schemas.microsoft.com/office/drawing/2014/main" id="{CB1F6871-9C91-46B6-8443-55540A057544}"/>
+                <a16:creationId xmlns:a16="http://schemas.microsoft.com/office/drawing/2014/main" id="{D12B1F80-513C-4895-BC32-633ADC0840B3}"/>
               </a:ext>
             </a:extLst>
           </p:cNvPr>
@@ -2249,7 +2442,7 @@
           <a:p>
             <a:fld id="{30976E16-775E-4B4F-9FA1-C4EE629F34C1}" type="datetimeFigureOut">
               <a:rPr lang="en-IL" smtClean="0"/>
-              <a:t>09/09/2020</a:t>
+              <a:t>13/09/2020</a:t>
             </a:fld>
             <a:endParaRPr lang="en-IL"/>
           </a:p>
@@ -2260,7 +2453,7 @@
           <p:cNvPr id="6" name="Footer Placeholder 5">
             <a:extLst>
               <a:ext uri="{FF2B5EF4-FFF2-40B4-BE49-F238E27FC236}">
-                <a16:creationId xmlns:a16="http://schemas.microsoft.com/office/drawing/2014/main" id="{00BFB8C2-8350-407D-B55A-624EAE1A4319}"/>
+                <a16:creationId xmlns:a16="http://schemas.microsoft.com/office/drawing/2014/main" id="{BA0A5B7C-7B15-4101-A47A-DFEB34308663}"/>
               </a:ext>
             </a:extLst>
           </p:cNvPr>
@@ -2285,7 +2478,7 @@
           <p:cNvPr id="7" name="Slide Number Placeholder 6">
             <a:extLst>
               <a:ext uri="{FF2B5EF4-FFF2-40B4-BE49-F238E27FC236}">
-                <a16:creationId xmlns:a16="http://schemas.microsoft.com/office/drawing/2014/main" id="{A02DD490-6F37-4927-AEA1-9FB09A285324}"/>
+                <a16:creationId xmlns:a16="http://schemas.microsoft.com/office/drawing/2014/main" id="{2B750D62-25E6-4DF4-B3EE-33115C641EA0}"/>
               </a:ext>
             </a:extLst>
           </p:cNvPr>
@@ -2312,7 +2505,7 @@
     </p:spTree>
     <p:extLst>
       <p:ext uri="{BB962C8B-B14F-4D97-AF65-F5344CB8AC3E}">
-        <p14:creationId xmlns:p14="http://schemas.microsoft.com/office/powerpoint/2010/main" val="2548120684"/>
+        <p14:creationId xmlns:p14="http://schemas.microsoft.com/office/powerpoint/2010/main" val="498014354"/>
       </p:ext>
     </p:extLst>
   </p:cSld>
@@ -2344,7 +2537,7 @@
           <p:cNvPr id="2" name="Title 1">
             <a:extLst>
               <a:ext uri="{FF2B5EF4-FFF2-40B4-BE49-F238E27FC236}">
-                <a16:creationId xmlns:a16="http://schemas.microsoft.com/office/drawing/2014/main" id="{3BB7C3EE-0FFE-4699-B9B9-24E3F043A71D}"/>
+                <a16:creationId xmlns:a16="http://schemas.microsoft.com/office/drawing/2014/main" id="{FEA54B73-034E-41FF-BF7F-6AD40BF9BA59}"/>
               </a:ext>
             </a:extLst>
           </p:cNvPr>
@@ -2369,7 +2562,7 @@
               <a:rPr lang="en-US"/>
               <a:t>Click to edit Master title style</a:t>
             </a:r>
-            <a:endParaRPr lang="LID4096"/>
+            <a:endParaRPr lang="en-IL"/>
           </a:p>
         </p:txBody>
       </p:sp>
@@ -2378,7 +2571,7 @@
           <p:cNvPr id="3" name="Text Placeholder 2">
             <a:extLst>
               <a:ext uri="{FF2B5EF4-FFF2-40B4-BE49-F238E27FC236}">
-                <a16:creationId xmlns:a16="http://schemas.microsoft.com/office/drawing/2014/main" id="{F3AB5D1F-F544-4A04-BB13-5C6EBDF7C141}"/>
+                <a16:creationId xmlns:a16="http://schemas.microsoft.com/office/drawing/2014/main" id="{14745A72-68BC-4483-B278-87669CCA2D63}"/>
               </a:ext>
             </a:extLst>
           </p:cNvPr>
@@ -2449,7 +2642,7 @@
           <p:cNvPr id="4" name="Content Placeholder 3">
             <a:extLst>
               <a:ext uri="{FF2B5EF4-FFF2-40B4-BE49-F238E27FC236}">
-                <a16:creationId xmlns:a16="http://schemas.microsoft.com/office/drawing/2014/main" id="{E419767E-4ECA-485C-8250-0138CC626C2C}"/>
+                <a16:creationId xmlns:a16="http://schemas.microsoft.com/office/drawing/2014/main" id="{FB853F61-56C8-4154-9A2C-23222850F038}"/>
               </a:ext>
             </a:extLst>
           </p:cNvPr>
@@ -2503,7 +2696,7 @@
               <a:rPr lang="en-US"/>
               <a:t>Fifth level</a:t>
             </a:r>
-            <a:endParaRPr lang="LID4096"/>
+            <a:endParaRPr lang="en-IL"/>
           </a:p>
         </p:txBody>
       </p:sp>
@@ -2512,7 +2705,7 @@
           <p:cNvPr id="5" name="Text Placeholder 4">
             <a:extLst>
               <a:ext uri="{FF2B5EF4-FFF2-40B4-BE49-F238E27FC236}">
-                <a16:creationId xmlns:a16="http://schemas.microsoft.com/office/drawing/2014/main" id="{DADE54C4-676A-4A90-AB6F-DDDA8F71DBD3}"/>
+                <a16:creationId xmlns:a16="http://schemas.microsoft.com/office/drawing/2014/main" id="{C4F18092-60AD-4D51-AD0D-C7C79A44B23C}"/>
               </a:ext>
             </a:extLst>
           </p:cNvPr>
@@ -2583,7 +2776,7 @@
           <p:cNvPr id="6" name="Content Placeholder 5">
             <a:extLst>
               <a:ext uri="{FF2B5EF4-FFF2-40B4-BE49-F238E27FC236}">
-                <a16:creationId xmlns:a16="http://schemas.microsoft.com/office/drawing/2014/main" id="{2C33222F-0F98-4D13-B9DC-AA03C00E8178}"/>
+                <a16:creationId xmlns:a16="http://schemas.microsoft.com/office/drawing/2014/main" id="{C996877E-97F0-40D3-99AC-1AF91E82D6B9}"/>
               </a:ext>
             </a:extLst>
           </p:cNvPr>
@@ -2637,7 +2830,7 @@
               <a:rPr lang="en-US"/>
               <a:t>Fifth level</a:t>
             </a:r>
-            <a:endParaRPr lang="LID4096"/>
+            <a:endParaRPr lang="en-IL"/>
           </a:p>
         </p:txBody>
       </p:sp>
@@ -2646,7 +2839,7 @@
           <p:cNvPr id="7" name="Date Placeholder 6">
             <a:extLst>
               <a:ext uri="{FF2B5EF4-FFF2-40B4-BE49-F238E27FC236}">
-                <a16:creationId xmlns:a16="http://schemas.microsoft.com/office/drawing/2014/main" id="{BB094606-2975-429B-A5AE-1D979F38D082}"/>
+                <a16:creationId xmlns:a16="http://schemas.microsoft.com/office/drawing/2014/main" id="{9DD375C1-23AF-4A7D-95CE-B86DC2192FA1}"/>
               </a:ext>
             </a:extLst>
           </p:cNvPr>
@@ -2664,7 +2857,7 @@
           <a:p>
             <a:fld id="{30976E16-775E-4B4F-9FA1-C4EE629F34C1}" type="datetimeFigureOut">
               <a:rPr lang="en-IL" smtClean="0"/>
-              <a:t>09/09/2020</a:t>
+              <a:t>13/09/2020</a:t>
             </a:fld>
             <a:endParaRPr lang="en-IL"/>
           </a:p>
@@ -2675,7 +2868,7 @@
           <p:cNvPr id="8" name="Footer Placeholder 7">
             <a:extLst>
               <a:ext uri="{FF2B5EF4-FFF2-40B4-BE49-F238E27FC236}">
-                <a16:creationId xmlns:a16="http://schemas.microsoft.com/office/drawing/2014/main" id="{B7753449-91EC-4AAE-A3DA-6DF3B38D4B7A}"/>
+                <a16:creationId xmlns:a16="http://schemas.microsoft.com/office/drawing/2014/main" id="{85F6F9D4-1891-4FC0-B609-55611115FA4D}"/>
               </a:ext>
             </a:extLst>
           </p:cNvPr>
@@ -2700,7 +2893,7 @@
           <p:cNvPr id="9" name="Slide Number Placeholder 8">
             <a:extLst>
               <a:ext uri="{FF2B5EF4-FFF2-40B4-BE49-F238E27FC236}">
-                <a16:creationId xmlns:a16="http://schemas.microsoft.com/office/drawing/2014/main" id="{95937CB8-130F-4435-98CE-E213107FD0E6}"/>
+                <a16:creationId xmlns:a16="http://schemas.microsoft.com/office/drawing/2014/main" id="{86885525-34AA-4DBB-B605-D18899217A2C}"/>
               </a:ext>
             </a:extLst>
           </p:cNvPr>
@@ -2727,7 +2920,7 @@
     </p:spTree>
     <p:extLst>
       <p:ext uri="{BB962C8B-B14F-4D97-AF65-F5344CB8AC3E}">
-        <p14:creationId xmlns:p14="http://schemas.microsoft.com/office/powerpoint/2010/main" val="27232042"/>
+        <p14:creationId xmlns:p14="http://schemas.microsoft.com/office/powerpoint/2010/main" val="446262326"/>
       </p:ext>
     </p:extLst>
   </p:cSld>
@@ -2759,7 +2952,7 @@
           <p:cNvPr id="2" name="Title 1">
             <a:extLst>
               <a:ext uri="{FF2B5EF4-FFF2-40B4-BE49-F238E27FC236}">
-                <a16:creationId xmlns:a16="http://schemas.microsoft.com/office/drawing/2014/main" id="{9FCCFD46-3F1B-42A5-8543-0ECE311C3B9B}"/>
+                <a16:creationId xmlns:a16="http://schemas.microsoft.com/office/drawing/2014/main" id="{034D6F87-595E-4191-923E-5A39411D0230}"/>
               </a:ext>
             </a:extLst>
           </p:cNvPr>
@@ -2779,7 +2972,7 @@
               <a:rPr lang="en-US"/>
               <a:t>Click to edit Master title style</a:t>
             </a:r>
-            <a:endParaRPr lang="LID4096"/>
+            <a:endParaRPr lang="en-IL"/>
           </a:p>
         </p:txBody>
       </p:sp>
@@ -2788,7 +2981,7 @@
           <p:cNvPr id="3" name="Date Placeholder 2">
             <a:extLst>
               <a:ext uri="{FF2B5EF4-FFF2-40B4-BE49-F238E27FC236}">
-                <a16:creationId xmlns:a16="http://schemas.microsoft.com/office/drawing/2014/main" id="{F684DE43-4574-48E1-AB42-DE81B3C64AED}"/>
+                <a16:creationId xmlns:a16="http://schemas.microsoft.com/office/drawing/2014/main" id="{274FEF8E-FF76-447D-B365-EEB4B7462FEF}"/>
               </a:ext>
             </a:extLst>
           </p:cNvPr>
@@ -2806,7 +2999,7 @@
           <a:p>
             <a:fld id="{30976E16-775E-4B4F-9FA1-C4EE629F34C1}" type="datetimeFigureOut">
               <a:rPr lang="en-IL" smtClean="0"/>
-              <a:t>09/09/2020</a:t>
+              <a:t>13/09/2020</a:t>
             </a:fld>
             <a:endParaRPr lang="en-IL"/>
           </a:p>
@@ -2817,7 +3010,7 @@
           <p:cNvPr id="4" name="Footer Placeholder 3">
             <a:extLst>
               <a:ext uri="{FF2B5EF4-FFF2-40B4-BE49-F238E27FC236}">
-                <a16:creationId xmlns:a16="http://schemas.microsoft.com/office/drawing/2014/main" id="{E87490BC-F359-4E16-BD92-E7C18E812B9E}"/>
+                <a16:creationId xmlns:a16="http://schemas.microsoft.com/office/drawing/2014/main" id="{28ECC30B-3AEF-4F11-AEEA-8EAC90DA049B}"/>
               </a:ext>
             </a:extLst>
           </p:cNvPr>
@@ -2842,7 +3035,7 @@
           <p:cNvPr id="5" name="Slide Number Placeholder 4">
             <a:extLst>
               <a:ext uri="{FF2B5EF4-FFF2-40B4-BE49-F238E27FC236}">
-                <a16:creationId xmlns:a16="http://schemas.microsoft.com/office/drawing/2014/main" id="{F8F642D2-48F6-41FE-8074-6D4147FBD405}"/>
+                <a16:creationId xmlns:a16="http://schemas.microsoft.com/office/drawing/2014/main" id="{CACCE5AA-84C7-438D-8A9F-E249B9F813E3}"/>
               </a:ext>
             </a:extLst>
           </p:cNvPr>
@@ -2869,7 +3062,7 @@
     </p:spTree>
     <p:extLst>
       <p:ext uri="{BB962C8B-B14F-4D97-AF65-F5344CB8AC3E}">
-        <p14:creationId xmlns:p14="http://schemas.microsoft.com/office/powerpoint/2010/main" val="3372828823"/>
+        <p14:creationId xmlns:p14="http://schemas.microsoft.com/office/powerpoint/2010/main" val="1748330919"/>
       </p:ext>
     </p:extLst>
   </p:cSld>
@@ -2901,7 +3094,7 @@
           <p:cNvPr id="2" name="Date Placeholder 1">
             <a:extLst>
               <a:ext uri="{FF2B5EF4-FFF2-40B4-BE49-F238E27FC236}">
-                <a16:creationId xmlns:a16="http://schemas.microsoft.com/office/drawing/2014/main" id="{CCBF2102-72B7-429C-B95E-5875290E2822}"/>
+                <a16:creationId xmlns:a16="http://schemas.microsoft.com/office/drawing/2014/main" id="{B2A7D524-1211-414F-95A6-23BE79AD4C64}"/>
               </a:ext>
             </a:extLst>
           </p:cNvPr>
@@ -2919,7 +3112,7 @@
           <a:p>
             <a:fld id="{30976E16-775E-4B4F-9FA1-C4EE629F34C1}" type="datetimeFigureOut">
               <a:rPr lang="en-IL" smtClean="0"/>
-              <a:t>09/09/2020</a:t>
+              <a:t>13/09/2020</a:t>
             </a:fld>
             <a:endParaRPr lang="en-IL"/>
           </a:p>
@@ -2930,7 +3123,7 @@
           <p:cNvPr id="3" name="Footer Placeholder 2">
             <a:extLst>
               <a:ext uri="{FF2B5EF4-FFF2-40B4-BE49-F238E27FC236}">
-                <a16:creationId xmlns:a16="http://schemas.microsoft.com/office/drawing/2014/main" id="{2AAD4090-B871-4104-945B-41B5528A4529}"/>
+                <a16:creationId xmlns:a16="http://schemas.microsoft.com/office/drawing/2014/main" id="{DD897956-98EE-4830-B2A5-836BD625845F}"/>
               </a:ext>
             </a:extLst>
           </p:cNvPr>
@@ -2955,7 +3148,7 @@
           <p:cNvPr id="4" name="Slide Number Placeholder 3">
             <a:extLst>
               <a:ext uri="{FF2B5EF4-FFF2-40B4-BE49-F238E27FC236}">
-                <a16:creationId xmlns:a16="http://schemas.microsoft.com/office/drawing/2014/main" id="{6A50AE59-F7BD-4DF2-BFFD-84127AA54BA2}"/>
+                <a16:creationId xmlns:a16="http://schemas.microsoft.com/office/drawing/2014/main" id="{63C6BD88-C36D-4111-A866-15FC36A5A28A}"/>
               </a:ext>
             </a:extLst>
           </p:cNvPr>
@@ -2982,7 +3175,7 @@
     </p:spTree>
     <p:extLst>
       <p:ext uri="{BB962C8B-B14F-4D97-AF65-F5344CB8AC3E}">
-        <p14:creationId xmlns:p14="http://schemas.microsoft.com/office/powerpoint/2010/main" val="87286295"/>
+        <p14:creationId xmlns:p14="http://schemas.microsoft.com/office/powerpoint/2010/main" val="742121504"/>
       </p:ext>
     </p:extLst>
   </p:cSld>
@@ -3014,7 +3207,7 @@
           <p:cNvPr id="2" name="Title 1">
             <a:extLst>
               <a:ext uri="{FF2B5EF4-FFF2-40B4-BE49-F238E27FC236}">
-                <a16:creationId xmlns:a16="http://schemas.microsoft.com/office/drawing/2014/main" id="{D4CB75CF-1A15-44F8-BD26-97AB708D9EEB}"/>
+                <a16:creationId xmlns:a16="http://schemas.microsoft.com/office/drawing/2014/main" id="{DD9F640B-22B4-4C46-8B78-79B07F807B5A}"/>
               </a:ext>
             </a:extLst>
           </p:cNvPr>
@@ -3043,7 +3236,7 @@
               <a:rPr lang="en-US"/>
               <a:t>Click to edit Master title style</a:t>
             </a:r>
-            <a:endParaRPr lang="LID4096"/>
+            <a:endParaRPr lang="en-IL"/>
           </a:p>
         </p:txBody>
       </p:sp>
@@ -3052,7 +3245,7 @@
           <p:cNvPr id="3" name="Content Placeholder 2">
             <a:extLst>
               <a:ext uri="{FF2B5EF4-FFF2-40B4-BE49-F238E27FC236}">
-                <a16:creationId xmlns:a16="http://schemas.microsoft.com/office/drawing/2014/main" id="{E5CB0A71-DE89-4F6B-B0E1-B8F9A14D161E}"/>
+                <a16:creationId xmlns:a16="http://schemas.microsoft.com/office/drawing/2014/main" id="{B8C0989E-4424-47FE-BCD8-8ADECC887F25}"/>
               </a:ext>
             </a:extLst>
           </p:cNvPr>
@@ -3134,7 +3327,7 @@
               <a:rPr lang="en-US"/>
               <a:t>Fifth level</a:t>
             </a:r>
-            <a:endParaRPr lang="LID4096"/>
+            <a:endParaRPr lang="en-IL"/>
           </a:p>
         </p:txBody>
       </p:sp>
@@ -3143,7 +3336,7 @@
           <p:cNvPr id="4" name="Text Placeholder 3">
             <a:extLst>
               <a:ext uri="{FF2B5EF4-FFF2-40B4-BE49-F238E27FC236}">
-                <a16:creationId xmlns:a16="http://schemas.microsoft.com/office/drawing/2014/main" id="{3470EBA6-54BC-416A-A308-DDCCAC095232}"/>
+                <a16:creationId xmlns:a16="http://schemas.microsoft.com/office/drawing/2014/main" id="{2F2FEA50-4D93-4A5E-8D04-9820B60C7FA1}"/>
               </a:ext>
             </a:extLst>
           </p:cNvPr>
@@ -3214,7 +3407,7 @@
           <p:cNvPr id="5" name="Date Placeholder 4">
             <a:extLst>
               <a:ext uri="{FF2B5EF4-FFF2-40B4-BE49-F238E27FC236}">
-                <a16:creationId xmlns:a16="http://schemas.microsoft.com/office/drawing/2014/main" id="{B9FBC40F-D8D4-4202-ADAA-5F35188BF495}"/>
+                <a16:creationId xmlns:a16="http://schemas.microsoft.com/office/drawing/2014/main" id="{C1023041-67F9-4DD5-ACCD-95260AF9319D}"/>
               </a:ext>
             </a:extLst>
           </p:cNvPr>
@@ -3232,7 +3425,7 @@
           <a:p>
             <a:fld id="{30976E16-775E-4B4F-9FA1-C4EE629F34C1}" type="datetimeFigureOut">
               <a:rPr lang="en-IL" smtClean="0"/>
-              <a:t>09/09/2020</a:t>
+              <a:t>13/09/2020</a:t>
             </a:fld>
             <a:endParaRPr lang="en-IL"/>
           </a:p>
@@ -3243,7 +3436,7 @@
           <p:cNvPr id="6" name="Footer Placeholder 5">
             <a:extLst>
               <a:ext uri="{FF2B5EF4-FFF2-40B4-BE49-F238E27FC236}">
-                <a16:creationId xmlns:a16="http://schemas.microsoft.com/office/drawing/2014/main" id="{46BA958E-FDAA-42D6-A33B-16E0EAA87C1E}"/>
+                <a16:creationId xmlns:a16="http://schemas.microsoft.com/office/drawing/2014/main" id="{9EDDAE1F-9C85-4539-9FDC-8B0432DC64E7}"/>
               </a:ext>
             </a:extLst>
           </p:cNvPr>
@@ -3268,7 +3461,7 @@
           <p:cNvPr id="7" name="Slide Number Placeholder 6">
             <a:extLst>
               <a:ext uri="{FF2B5EF4-FFF2-40B4-BE49-F238E27FC236}">
-                <a16:creationId xmlns:a16="http://schemas.microsoft.com/office/drawing/2014/main" id="{7291A11A-56B7-4FE1-BD4C-1165706FC9FB}"/>
+                <a16:creationId xmlns:a16="http://schemas.microsoft.com/office/drawing/2014/main" id="{82526E80-82FC-4DB7-B7C1-E1B6AE88C823}"/>
               </a:ext>
             </a:extLst>
           </p:cNvPr>
@@ -3295,7 +3488,7 @@
     </p:spTree>
     <p:extLst>
       <p:ext uri="{BB962C8B-B14F-4D97-AF65-F5344CB8AC3E}">
-        <p14:creationId xmlns:p14="http://schemas.microsoft.com/office/powerpoint/2010/main" val="3650921323"/>
+        <p14:creationId xmlns:p14="http://schemas.microsoft.com/office/powerpoint/2010/main" val="1483138303"/>
       </p:ext>
     </p:extLst>
   </p:cSld>
@@ -3327,7 +3520,7 @@
           <p:cNvPr id="2" name="Title 1">
             <a:extLst>
               <a:ext uri="{FF2B5EF4-FFF2-40B4-BE49-F238E27FC236}">
-                <a16:creationId xmlns:a16="http://schemas.microsoft.com/office/drawing/2014/main" id="{C44D3709-4BA0-46E6-AC25-E33A7D314A6F}"/>
+                <a16:creationId xmlns:a16="http://schemas.microsoft.com/office/drawing/2014/main" id="{F3FD8B19-3D68-47F7-9238-51421DE823A0}"/>
               </a:ext>
             </a:extLst>
           </p:cNvPr>
@@ -3356,7 +3549,7 @@
               <a:rPr lang="en-US"/>
               <a:t>Click to edit Master title style</a:t>
             </a:r>
-            <a:endParaRPr lang="LID4096"/>
+            <a:endParaRPr lang="en-IL"/>
           </a:p>
         </p:txBody>
       </p:sp>
@@ -3365,7 +3558,7 @@
           <p:cNvPr id="3" name="Picture Placeholder 2">
             <a:extLst>
               <a:ext uri="{FF2B5EF4-FFF2-40B4-BE49-F238E27FC236}">
-                <a16:creationId xmlns:a16="http://schemas.microsoft.com/office/drawing/2014/main" id="{A8638A15-E8CC-45F2-8590-F6E851397A11}"/>
+                <a16:creationId xmlns:a16="http://schemas.microsoft.com/office/drawing/2014/main" id="{D042F4CA-59F6-47A5-A7A8-E7B0B54E0531}"/>
               </a:ext>
             </a:extLst>
           </p:cNvPr>
@@ -3423,7 +3616,7 @@
             </a:lvl9pPr>
           </a:lstStyle>
           <a:p>
-            <a:endParaRPr lang="LID4096"/>
+            <a:endParaRPr lang="en-IL"/>
           </a:p>
         </p:txBody>
       </p:sp>
@@ -3432,7 +3625,7 @@
           <p:cNvPr id="4" name="Text Placeholder 3">
             <a:extLst>
               <a:ext uri="{FF2B5EF4-FFF2-40B4-BE49-F238E27FC236}">
-                <a16:creationId xmlns:a16="http://schemas.microsoft.com/office/drawing/2014/main" id="{2651AE06-56CA-4EBA-BA88-CF9B8B1AF8EB}"/>
+                <a16:creationId xmlns:a16="http://schemas.microsoft.com/office/drawing/2014/main" id="{91BAB412-8D0B-47A1-BAF8-D96C4CE9C4B1}"/>
               </a:ext>
             </a:extLst>
           </p:cNvPr>
@@ -3503,7 +3696,7 @@
           <p:cNvPr id="5" name="Date Placeholder 4">
             <a:extLst>
               <a:ext uri="{FF2B5EF4-FFF2-40B4-BE49-F238E27FC236}">
-                <a16:creationId xmlns:a16="http://schemas.microsoft.com/office/drawing/2014/main" id="{5AFE829A-49DC-4881-B7A4-8121C863C5F4}"/>
+                <a16:creationId xmlns:a16="http://schemas.microsoft.com/office/drawing/2014/main" id="{46A0E0B9-B1FD-45B7-BFAB-A3CED7499D14}"/>
               </a:ext>
             </a:extLst>
           </p:cNvPr>
@@ -3521,7 +3714,7 @@
           <a:p>
             <a:fld id="{30976E16-775E-4B4F-9FA1-C4EE629F34C1}" type="datetimeFigureOut">
               <a:rPr lang="en-IL" smtClean="0"/>
-              <a:t>09/09/2020</a:t>
+              <a:t>13/09/2020</a:t>
             </a:fld>
             <a:endParaRPr lang="en-IL"/>
           </a:p>
@@ -3532,7 +3725,7 @@
           <p:cNvPr id="6" name="Footer Placeholder 5">
             <a:extLst>
               <a:ext uri="{FF2B5EF4-FFF2-40B4-BE49-F238E27FC236}">
-                <a16:creationId xmlns:a16="http://schemas.microsoft.com/office/drawing/2014/main" id="{68B805C8-EB73-4363-AB2B-94EB445D72B7}"/>
+                <a16:creationId xmlns:a16="http://schemas.microsoft.com/office/drawing/2014/main" id="{2D0D3E7C-8425-490F-B1BB-1D49DA471F1E}"/>
               </a:ext>
             </a:extLst>
           </p:cNvPr>
@@ -3557,7 +3750,7 @@
           <p:cNvPr id="7" name="Slide Number Placeholder 6">
             <a:extLst>
               <a:ext uri="{FF2B5EF4-FFF2-40B4-BE49-F238E27FC236}">
-                <a16:creationId xmlns:a16="http://schemas.microsoft.com/office/drawing/2014/main" id="{2CBC03D4-975D-4D11-B266-8D0548288A64}"/>
+                <a16:creationId xmlns:a16="http://schemas.microsoft.com/office/drawing/2014/main" id="{856B09A5-8FB0-444C-AC32-40B24A7B1F4C}"/>
               </a:ext>
             </a:extLst>
           </p:cNvPr>
@@ -3584,7 +3777,7 @@
     </p:spTree>
     <p:extLst>
       <p:ext uri="{BB962C8B-B14F-4D97-AF65-F5344CB8AC3E}">
-        <p14:creationId xmlns:p14="http://schemas.microsoft.com/office/powerpoint/2010/main" val="448661355"/>
+        <p14:creationId xmlns:p14="http://schemas.microsoft.com/office/powerpoint/2010/main" val="4289791997"/>
       </p:ext>
     </p:extLst>
   </p:cSld>
@@ -3598,21 +3791,9 @@
 <p:sldMaster xmlns:a="http://schemas.openxmlformats.org/drawingml/2006/main" xmlns:r="http://schemas.openxmlformats.org/officeDocument/2006/relationships" xmlns:p="http://schemas.openxmlformats.org/presentationml/2006/main">
   <p:cSld>
     <p:bg>
-      <p:bgPr>
-        <a:gradFill flip="none" rotWithShape="1">
-          <a:gsLst>
-            <a:gs pos="95000">
-              <a:schemeClr val="bg1"/>
-            </a:gs>
-            <a:gs pos="0">
-              <a:srgbClr val="B9859F"/>
-            </a:gs>
-          </a:gsLst>
-          <a:lin ang="8100000" scaled="1"/>
-          <a:tileRect/>
-        </a:gradFill>
-        <a:effectLst/>
-      </p:bgPr>
+      <p:bgRef idx="1001">
+        <a:schemeClr val="bg1"/>
+      </p:bgRef>
     </p:bg>
     <p:spTree>
       <p:nvGrpSpPr>
@@ -3633,7 +3814,7 @@
           <p:cNvPr id="2" name="Title Placeholder 1">
             <a:extLst>
               <a:ext uri="{FF2B5EF4-FFF2-40B4-BE49-F238E27FC236}">
-                <a16:creationId xmlns:a16="http://schemas.microsoft.com/office/drawing/2014/main" id="{9B964A40-3A68-425E-B374-AA07EEFA6796}"/>
+                <a16:creationId xmlns:a16="http://schemas.microsoft.com/office/drawing/2014/main" id="{44A2FEF8-78EE-41A9-BCE9-0375B6496CF8}"/>
               </a:ext>
             </a:extLst>
           </p:cNvPr>
@@ -3663,7 +3844,7 @@
               <a:rPr lang="en-US"/>
               <a:t>Click to edit Master title style</a:t>
             </a:r>
-            <a:endParaRPr lang="LID4096"/>
+            <a:endParaRPr lang="en-IL"/>
           </a:p>
         </p:txBody>
       </p:sp>
@@ -3672,7 +3853,7 @@
           <p:cNvPr id="3" name="Text Placeholder 2">
             <a:extLst>
               <a:ext uri="{FF2B5EF4-FFF2-40B4-BE49-F238E27FC236}">
-                <a16:creationId xmlns:a16="http://schemas.microsoft.com/office/drawing/2014/main" id="{59859477-3882-453E-A6E5-60A8582F5ADD}"/>
+                <a16:creationId xmlns:a16="http://schemas.microsoft.com/office/drawing/2014/main" id="{F824AA11-9A43-4B98-994D-3DC531D6C821}"/>
               </a:ext>
             </a:extLst>
           </p:cNvPr>
@@ -3731,7 +3912,7 @@
               <a:rPr lang="en-US"/>
               <a:t>Fifth level</a:t>
             </a:r>
-            <a:endParaRPr lang="LID4096"/>
+            <a:endParaRPr lang="en-IL"/>
           </a:p>
         </p:txBody>
       </p:sp>
@@ -3740,7 +3921,7 @@
           <p:cNvPr id="4" name="Date Placeholder 3">
             <a:extLst>
               <a:ext uri="{FF2B5EF4-FFF2-40B4-BE49-F238E27FC236}">
-                <a16:creationId xmlns:a16="http://schemas.microsoft.com/office/drawing/2014/main" id="{0E648D17-8007-4C7F-AAD3-1B75D44B6DB0}"/>
+                <a16:creationId xmlns:a16="http://schemas.microsoft.com/office/drawing/2014/main" id="{FC895F88-4EA7-4DE4-BA1E-27FFCE93FB6D}"/>
               </a:ext>
             </a:extLst>
           </p:cNvPr>
@@ -3776,7 +3957,7 @@
           <a:p>
             <a:fld id="{30976E16-775E-4B4F-9FA1-C4EE629F34C1}" type="datetimeFigureOut">
               <a:rPr lang="en-IL" smtClean="0"/>
-              <a:t>09/09/2020</a:t>
+              <a:t>13/09/2020</a:t>
             </a:fld>
             <a:endParaRPr lang="en-IL"/>
           </a:p>
@@ -3787,7 +3968,7 @@
           <p:cNvPr id="5" name="Footer Placeholder 4">
             <a:extLst>
               <a:ext uri="{FF2B5EF4-FFF2-40B4-BE49-F238E27FC236}">
-                <a16:creationId xmlns:a16="http://schemas.microsoft.com/office/drawing/2014/main" id="{BEA67D0D-F9CB-4736-9EED-89B9AA2FC331}"/>
+                <a16:creationId xmlns:a16="http://schemas.microsoft.com/office/drawing/2014/main" id="{AC5700F1-21A0-46C1-ACBA-F511E5A2DB9C}"/>
               </a:ext>
             </a:extLst>
           </p:cNvPr>
@@ -3830,7 +4011,7 @@
           <p:cNvPr id="6" name="Slide Number Placeholder 5">
             <a:extLst>
               <a:ext uri="{FF2B5EF4-FFF2-40B4-BE49-F238E27FC236}">
-                <a16:creationId xmlns:a16="http://schemas.microsoft.com/office/drawing/2014/main" id="{89E053B2-3F0D-4AD4-8AA5-AE520D2A5037}"/>
+                <a16:creationId xmlns:a16="http://schemas.microsoft.com/office/drawing/2014/main" id="{BDB45EAF-0D1D-4F53-8072-65B13449E441}"/>
               </a:ext>
             </a:extLst>
           </p:cNvPr>
@@ -3877,7 +4058,7 @@
           <p:cNvPr id="7" name="Content Placeholder 7" descr="A close up of a sign&#10;&#10;Description automatically generated">
             <a:extLst>
               <a:ext uri="{FF2B5EF4-FFF2-40B4-BE49-F238E27FC236}">
-                <a16:creationId xmlns:a16="http://schemas.microsoft.com/office/drawing/2014/main" id="{BBF52B1A-1914-4000-9E3D-AF4ACDCC2240}"/>
+                <a16:creationId xmlns:a16="http://schemas.microsoft.com/office/drawing/2014/main" id="{6A0A8485-2CFD-4745-AA03-4E82E6A90217}"/>
               </a:ext>
             </a:extLst>
           </p:cNvPr>
@@ -3911,23 +4092,23 @@
     </p:spTree>
     <p:extLst>
       <p:ext uri="{BB962C8B-B14F-4D97-AF65-F5344CB8AC3E}">
-        <p14:creationId xmlns:p14="http://schemas.microsoft.com/office/powerpoint/2010/main" val="1716611254"/>
+        <p14:creationId xmlns:p14="http://schemas.microsoft.com/office/powerpoint/2010/main" val="2175814133"/>
       </p:ext>
     </p:extLst>
   </p:cSld>
   <p:clrMap bg1="lt1" tx1="dk1" bg2="lt2" tx2="dk2" accent1="accent1" accent2="accent2" accent3="accent3" accent4="accent4" accent5="accent5" accent6="accent6" hlink="hlink" folHlink="folHlink"/>
   <p:sldLayoutIdLst>
-    <p:sldLayoutId id="2147483680" r:id="rId1"/>
-    <p:sldLayoutId id="2147483681" r:id="rId2"/>
-    <p:sldLayoutId id="2147483682" r:id="rId3"/>
-    <p:sldLayoutId id="2147483683" r:id="rId4"/>
-    <p:sldLayoutId id="2147483684" r:id="rId5"/>
-    <p:sldLayoutId id="2147483685" r:id="rId6"/>
-    <p:sldLayoutId id="2147483686" r:id="rId7"/>
-    <p:sldLayoutId id="2147483687" r:id="rId8"/>
-    <p:sldLayoutId id="2147483688" r:id="rId9"/>
-    <p:sldLayoutId id="2147483689" r:id="rId10"/>
-    <p:sldLayoutId id="2147483690" r:id="rId11"/>
+    <p:sldLayoutId id="2147483740" r:id="rId1"/>
+    <p:sldLayoutId id="2147483741" r:id="rId2"/>
+    <p:sldLayoutId id="2147483742" r:id="rId3"/>
+    <p:sldLayoutId id="2147483743" r:id="rId4"/>
+    <p:sldLayoutId id="2147483744" r:id="rId5"/>
+    <p:sldLayoutId id="2147483745" r:id="rId6"/>
+    <p:sldLayoutId id="2147483746" r:id="rId7"/>
+    <p:sldLayoutId id="2147483747" r:id="rId8"/>
+    <p:sldLayoutId id="2147483748" r:id="rId9"/>
+    <p:sldLayoutId id="2147483749" r:id="rId10"/>
+    <p:sldLayoutId id="2147483750" r:id="rId11"/>
   </p:sldLayoutIdLst>
   <p:txStyles>
     <p:titleStyle>
@@ -4115,7 +4296,7 @@
     </p:bodyStyle>
     <p:otherStyle>
       <a:defPPr>
-        <a:defRPr lang="LID4096"/>
+        <a:defRPr lang="en-IL"/>
       </a:defPPr>
       <a:lvl1pPr marL="0" algn="l" defTabSz="914400" rtl="0" eaLnBrk="1" latinLnBrk="0" hangingPunct="1">
         <a:defRPr sz="1800" kern="1200">
@@ -4229,12 +4410,75 @@
           <a:chExt cx="0" cy="0"/>
         </a:xfrm>
       </p:grpSpPr>
-      <p:sp>
-        <p:nvSpPr>
-          <p:cNvPr id="4" name="Rectangle 3">
-            <a:extLst>
-              <a:ext uri="{FF2B5EF4-FFF2-40B4-BE49-F238E27FC236}">
-                <a16:creationId xmlns:a16="http://schemas.microsoft.com/office/drawing/2014/main" id="{1AE8CB99-5F33-40AE-9182-2F0CB86B2AF7}"/>
+      <p:pic>
+        <p:nvPicPr>
+          <p:cNvPr id="12" name="Picture 11">
+            <a:extLst>
+              <a:ext uri="{FF2B5EF4-FFF2-40B4-BE49-F238E27FC236}">
+                <a16:creationId xmlns:a16="http://schemas.microsoft.com/office/drawing/2014/main" id="{B83B2637-269C-4E56-A9B2-111462B9C1D7}"/>
+              </a:ext>
+            </a:extLst>
+          </p:cNvPr>
+          <p:cNvPicPr>
+            <a:picLocks noChangeAspect="1"/>
+          </p:cNvPicPr>
+          <p:nvPr/>
+        </p:nvPicPr>
+        <p:blipFill>
+          <a:blip r:embed="rId2"/>
+          <a:stretch>
+            <a:fillRect/>
+          </a:stretch>
+        </p:blipFill>
+        <p:spPr>
+          <a:xfrm>
+            <a:off x="5086189" y="922562"/>
+            <a:ext cx="2898482" cy="2610038"/>
+          </a:xfrm>
+          <a:prstGeom prst="rect">
+            <a:avLst/>
+          </a:prstGeom>
+        </p:spPr>
+      </p:pic>
+    </p:spTree>
+    <p:extLst>
+      <p:ext uri="{BB962C8B-B14F-4D97-AF65-F5344CB8AC3E}">
+        <p14:creationId xmlns:p14="http://schemas.microsoft.com/office/powerpoint/2010/main" val="88507329"/>
+      </p:ext>
+    </p:extLst>
+  </p:cSld>
+  <p:clrMapOvr>
+    <a:masterClrMapping/>
+  </p:clrMapOvr>
+  <p:transition spd="slow">
+    <p:push dir="u"/>
+  </p:transition>
+</p:sld>
+</file>
+
+<file path=ppt/slides/slide2.xml><?xml version="1.0" encoding="utf-8"?>
+<p:sld xmlns:a="http://schemas.openxmlformats.org/drawingml/2006/main" xmlns:r="http://schemas.openxmlformats.org/officeDocument/2006/relationships" xmlns:p="http://schemas.openxmlformats.org/presentationml/2006/main">
+  <p:cSld>
+    <p:spTree>
+      <p:nvGrpSpPr>
+        <p:cNvPr id="1" name=""/>
+        <p:cNvGrpSpPr/>
+        <p:nvPr/>
+      </p:nvGrpSpPr>
+      <p:grpSpPr>
+        <a:xfrm>
+          <a:off x="0" y="0"/>
+          <a:ext cx="0" cy="0"/>
+          <a:chOff x="0" y="0"/>
+          <a:chExt cx="0" cy="0"/>
+        </a:xfrm>
+      </p:grpSpPr>
+      <p:sp>
+        <p:nvSpPr>
+          <p:cNvPr id="5" name="Rectangle 4">
+            <a:extLst>
+              <a:ext uri="{FF2B5EF4-FFF2-40B4-BE49-F238E27FC236}">
+                <a16:creationId xmlns:a16="http://schemas.microsoft.com/office/drawing/2014/main" id="{E86833B7-BE2E-4401-AAA6-99D865CE89B8}"/>
               </a:ext>
             </a:extLst>
           </p:cNvPr>
@@ -4243,7 +4487,7 @@
         </p:nvSpPr>
         <p:spPr>
           <a:xfrm>
-            <a:off x="863371" y="561293"/>
+            <a:off x="788994" y="570399"/>
             <a:ext cx="10854417" cy="420461"/>
           </a:xfrm>
           <a:prstGeom prst="rect">
@@ -4275,120 +4519,12 @@
           </a:p>
         </p:txBody>
       </p:sp>
-      <p:sp>
-        <p:nvSpPr>
-          <p:cNvPr id="5" name="Rectangle 4">
-            <a:extLst>
-              <a:ext uri="{FF2B5EF4-FFF2-40B4-BE49-F238E27FC236}">
-                <a16:creationId xmlns:a16="http://schemas.microsoft.com/office/drawing/2014/main" id="{25205746-4856-4F20-84F5-4DE129164C93}"/>
-              </a:ext>
-            </a:extLst>
-          </p:cNvPr>
-          <p:cNvSpPr/>
-          <p:nvPr/>
-        </p:nvSpPr>
-        <p:spPr>
-          <a:xfrm>
-            <a:off x="1030739" y="620484"/>
-            <a:ext cx="922565" cy="302078"/>
-          </a:xfrm>
-          <a:prstGeom prst="rect">
-            <a:avLst/>
-          </a:prstGeom>
-          <a:noFill/>
-        </p:spPr>
-        <p:style>
-          <a:lnRef idx="2">
-            <a:schemeClr val="accent3">
-              <a:shade val="50000"/>
-            </a:schemeClr>
-          </a:lnRef>
-          <a:fillRef idx="1">
-            <a:schemeClr val="accent3"/>
-          </a:fillRef>
-          <a:effectRef idx="0">
-            <a:schemeClr val="accent3"/>
-          </a:effectRef>
-          <a:fontRef idx="minor">
-            <a:schemeClr val="lt1"/>
-          </a:fontRef>
-        </p:style>
-        <p:txBody>
-          <a:bodyPr rtlCol="0" anchor="ctr"/>
-          <a:lstStyle/>
-          <a:p>
-            <a:pPr algn="ctr"/>
-            <a:r>
-              <a:rPr lang="en-US" dirty="0">
-                <a:solidFill>
-                  <a:schemeClr val="tx1"/>
-                </a:solidFill>
-              </a:rPr>
-              <a:t>flower</a:t>
-            </a:r>
-            <a:endParaRPr lang="en-IL" dirty="0">
-              <a:solidFill>
-                <a:schemeClr val="tx1"/>
-              </a:solidFill>
-            </a:endParaRPr>
-          </a:p>
-        </p:txBody>
-      </p:sp>
-      <p:sp>
-        <p:nvSpPr>
-          <p:cNvPr id="7" name="Rectangle 6">
-            <a:extLst>
-              <a:ext uri="{FF2B5EF4-FFF2-40B4-BE49-F238E27FC236}">
-                <a16:creationId xmlns:a16="http://schemas.microsoft.com/office/drawing/2014/main" id="{4E1F940F-A16A-494E-B972-B3BA652A1BA1}"/>
-              </a:ext>
-            </a:extLst>
-          </p:cNvPr>
-          <p:cNvSpPr/>
-          <p:nvPr/>
-        </p:nvSpPr>
-        <p:spPr>
-          <a:xfrm>
-            <a:off x="10466614" y="649061"/>
-            <a:ext cx="922565" cy="302078"/>
-          </a:xfrm>
-          <a:prstGeom prst="rect">
-            <a:avLst/>
-          </a:prstGeom>
-          <a:solidFill>
-            <a:schemeClr val="bg1"/>
-          </a:solidFill>
-        </p:spPr>
-        <p:style>
-          <a:lnRef idx="2">
-            <a:schemeClr val="accent3">
-              <a:shade val="50000"/>
-            </a:schemeClr>
-          </a:lnRef>
-          <a:fillRef idx="1">
-            <a:schemeClr val="accent3"/>
-          </a:fillRef>
-          <a:effectRef idx="0">
-            <a:schemeClr val="accent3"/>
-          </a:effectRef>
-          <a:fontRef idx="minor">
-            <a:schemeClr val="lt1"/>
-          </a:fontRef>
-        </p:style>
-        <p:txBody>
-          <a:bodyPr rtlCol="0" anchor="ctr"/>
-          <a:lstStyle/>
-          <a:p>
-            <a:pPr algn="ctr"/>
-            <a:endParaRPr lang="en-IL"/>
-          </a:p>
-        </p:txBody>
-      </p:sp>
       <p:graphicFrame>
         <p:nvGraphicFramePr>
-          <p:cNvPr id="8" name="Table 8">
-            <a:extLst>
-              <a:ext uri="{FF2B5EF4-FFF2-40B4-BE49-F238E27FC236}">
-                <a16:creationId xmlns:a16="http://schemas.microsoft.com/office/drawing/2014/main" id="{9FDB3F99-5824-4783-B878-448534EB4B98}"/>
+          <p:cNvPr id="9" name="Table 8">
+            <a:extLst>
+              <a:ext uri="{FF2B5EF4-FFF2-40B4-BE49-F238E27FC236}">
+                <a16:creationId xmlns:a16="http://schemas.microsoft.com/office/drawing/2014/main" id="{E9825A20-7879-448C-A896-691620033501}"/>
               </a:ext>
             </a:extLst>
           </p:cNvPr>
@@ -4398,14 +4534,14 @@
           <p:nvPr>
             <p:extLst>
               <p:ext uri="{D42A27DB-BD31-4B8C-83A1-F6EECF244321}">
-                <p14:modId xmlns:p14="http://schemas.microsoft.com/office/powerpoint/2010/main" val="488618164"/>
+                <p14:modId xmlns:p14="http://schemas.microsoft.com/office/powerpoint/2010/main" val="3049121272"/>
               </p:ext>
             </p:extLst>
           </p:nvPr>
         </p:nvGraphicFramePr>
         <p:xfrm>
-          <a:off x="3517900" y="1719791"/>
-          <a:ext cx="8127999" cy="1508760"/>
+          <a:off x="2950936" y="3167743"/>
+          <a:ext cx="8127999" cy="1596119"/>
         </p:xfrm>
         <a:graphic>
           <a:graphicData uri="http://schemas.openxmlformats.org/drawingml/2006/table">
@@ -4478,312 +4614,7 @@
                   </a:extLst>
                 </a:gridCol>
               </a:tblGrid>
-              <a:tr h="370840">
-                <a:tc>
-                  <a:txBody>
-                    <a:bodyPr/>
-                    <a:lstStyle/>
-                    <a:p>
-                      <a:endParaRPr lang="en-IL"/>
-                    </a:p>
-                  </a:txBody>
-                  <a:tcPr/>
-                </a:tc>
-                <a:tc>
-                  <a:txBody>
-                    <a:bodyPr/>
-                    <a:lstStyle/>
-                    <a:p>
-                      <a:endParaRPr lang="en-IL"/>
-                    </a:p>
-                  </a:txBody>
-                  <a:tcPr/>
-                </a:tc>
-                <a:tc>
-                  <a:txBody>
-                    <a:bodyPr/>
-                    <a:lstStyle/>
-                    <a:p>
-                      <a:endParaRPr lang="en-IL"/>
-                    </a:p>
-                  </a:txBody>
-                  <a:tcPr/>
-                </a:tc>
-                <a:tc>
-                  <a:txBody>
-                    <a:bodyPr/>
-                    <a:lstStyle/>
-                    <a:p>
-                      <a:endParaRPr lang="en-IL"/>
-                    </a:p>
-                  </a:txBody>
-                  <a:tcPr/>
-                </a:tc>
-                <a:tc>
-                  <a:txBody>
-                    <a:bodyPr/>
-                    <a:lstStyle/>
-                    <a:p>
-                      <a:endParaRPr lang="en-IL"/>
-                    </a:p>
-                  </a:txBody>
-                  <a:tcPr/>
-                </a:tc>
-                <a:tc>
-                  <a:txBody>
-                    <a:bodyPr/>
-                    <a:lstStyle/>
-                    <a:p>
-                      <a:endParaRPr lang="en-IL"/>
-                    </a:p>
-                  </a:txBody>
-                  <a:tcPr/>
-                </a:tc>
-                <a:tc>
-                  <a:txBody>
-                    <a:bodyPr/>
-                    <a:lstStyle/>
-                    <a:p>
-                      <a:endParaRPr lang="en-IL"/>
-                    </a:p>
-                  </a:txBody>
-                  <a:tcPr/>
-                </a:tc>
-                <a:tc>
-                  <a:txBody>
-                    <a:bodyPr/>
-                    <a:lstStyle/>
-                    <a:p>
-                      <a:endParaRPr lang="en-IL"/>
-                    </a:p>
-                  </a:txBody>
-                  <a:tcPr/>
-                </a:tc>
-                <a:tc>
-                  <a:txBody>
-                    <a:bodyPr/>
-                    <a:lstStyle/>
-                    <a:p>
-                      <a:r>
-                        <a:rPr lang="he-IL" sz="1000" dirty="0"/>
-                        <a:t>הטבלה של האשראי</a:t>
-                      </a:r>
-                      <a:endParaRPr lang="en-IL" sz="1000" dirty="0"/>
-                    </a:p>
-                  </a:txBody>
-                  <a:tcPr/>
-                </a:tc>
-                <a:extLst>
-                  <a:ext uri="{0D108BD9-81ED-4DB2-BD59-A6C34878D82A}">
-                    <a16:rowId xmlns:a16="http://schemas.microsoft.com/office/drawing/2014/main" val="2292436567"/>
-                  </a:ext>
-                </a:extLst>
-              </a:tr>
-              <a:tr h="370840">
-                <a:tc>
-                  <a:txBody>
-                    <a:bodyPr/>
-                    <a:lstStyle/>
-                    <a:p>
-                      <a:endParaRPr lang="en-IL"/>
-                    </a:p>
-                  </a:txBody>
-                  <a:tcPr/>
-                </a:tc>
-                <a:tc>
-                  <a:txBody>
-                    <a:bodyPr/>
-                    <a:lstStyle/>
-                    <a:p>
-                      <a:endParaRPr lang="en-IL"/>
-                    </a:p>
-                  </a:txBody>
-                  <a:tcPr/>
-                </a:tc>
-                <a:tc>
-                  <a:txBody>
-                    <a:bodyPr/>
-                    <a:lstStyle/>
-                    <a:p>
-                      <a:endParaRPr lang="en-IL"/>
-                    </a:p>
-                  </a:txBody>
-                  <a:tcPr/>
-                </a:tc>
-                <a:tc>
-                  <a:txBody>
-                    <a:bodyPr/>
-                    <a:lstStyle/>
-                    <a:p>
-                      <a:endParaRPr lang="en-IL"/>
-                    </a:p>
-                  </a:txBody>
-                  <a:tcPr/>
-                </a:tc>
-                <a:tc>
-                  <a:txBody>
-                    <a:bodyPr/>
-                    <a:lstStyle/>
-                    <a:p>
-                      <a:endParaRPr lang="en-IL"/>
-                    </a:p>
-                  </a:txBody>
-                  <a:tcPr/>
-                </a:tc>
-                <a:tc>
-                  <a:txBody>
-                    <a:bodyPr/>
-                    <a:lstStyle/>
-                    <a:p>
-                      <a:endParaRPr lang="en-IL"/>
-                    </a:p>
-                  </a:txBody>
-                  <a:tcPr/>
-                </a:tc>
-                <a:tc>
-                  <a:txBody>
-                    <a:bodyPr/>
-                    <a:lstStyle/>
-                    <a:p>
-                      <a:endParaRPr lang="en-IL"/>
-                    </a:p>
-                  </a:txBody>
-                  <a:tcPr/>
-                </a:tc>
-                <a:tc>
-                  <a:txBody>
-                    <a:bodyPr/>
-                    <a:lstStyle/>
-                    <a:p>
-                      <a:endParaRPr lang="en-IL"/>
-                    </a:p>
-                  </a:txBody>
-                  <a:tcPr/>
-                </a:tc>
-                <a:tc>
-                  <a:txBody>
-                    <a:bodyPr/>
-                    <a:lstStyle/>
-                    <a:p>
-                      <a:endParaRPr lang="en-IL"/>
-                    </a:p>
-                  </a:txBody>
-                  <a:tcPr/>
-                </a:tc>
-                <a:extLst>
-                  <a:ext uri="{0D108BD9-81ED-4DB2-BD59-A6C34878D82A}">
-                    <a16:rowId xmlns:a16="http://schemas.microsoft.com/office/drawing/2014/main" val="1769647751"/>
-                  </a:ext>
-                </a:extLst>
-              </a:tr>
-              <a:tr h="370840">
-                <a:tc>
-                  <a:txBody>
-                    <a:bodyPr/>
-                    <a:lstStyle/>
-                    <a:p>
-                      <a:endParaRPr lang="en-IL"/>
-                    </a:p>
-                  </a:txBody>
-                  <a:tcPr/>
-                </a:tc>
-                <a:tc>
-                  <a:txBody>
-                    <a:bodyPr/>
-                    <a:lstStyle/>
-                    <a:p>
-                      <a:endParaRPr lang="en-IL"/>
-                    </a:p>
-                  </a:txBody>
-                  <a:tcPr/>
-                </a:tc>
-                <a:tc>
-                  <a:txBody>
-                    <a:bodyPr/>
-                    <a:lstStyle/>
-                    <a:p>
-                      <a:endParaRPr lang="en-IL"/>
-                    </a:p>
-                  </a:txBody>
-                  <a:tcPr/>
-                </a:tc>
-                <a:tc>
-                  <a:txBody>
-                    <a:bodyPr/>
-                    <a:lstStyle/>
-                    <a:p>
-                      <a:endParaRPr lang="en-IL" dirty="0"/>
-                    </a:p>
-                  </a:txBody>
-                  <a:tcPr/>
-                </a:tc>
-                <a:tc>
-                  <a:txBody>
-                    <a:bodyPr/>
-                    <a:lstStyle/>
-                    <a:p>
-                      <a:endParaRPr lang="en-IL"/>
-                    </a:p>
-                  </a:txBody>
-                  <a:tcPr/>
-                </a:tc>
-                <a:tc>
-                  <a:txBody>
-                    <a:bodyPr/>
-                    <a:lstStyle/>
-                    <a:p>
-                      <a:endParaRPr lang="en-IL"/>
-                    </a:p>
-                  </a:txBody>
-                  <a:tcPr/>
-                </a:tc>
-                <a:tc>
-                  <a:txBody>
-                    <a:bodyPr/>
-                    <a:lstStyle/>
-                    <a:p>
-                      <a:endParaRPr lang="en-IL"/>
-                    </a:p>
-                  </a:txBody>
-                  <a:tcPr/>
-                </a:tc>
-                <a:tc>
-                  <a:txBody>
-                    <a:bodyPr/>
-                    <a:lstStyle/>
-                    <a:p>
-                      <a:endParaRPr lang="en-IL"/>
-                    </a:p>
-                  </a:txBody>
-                  <a:tcPr/>
-                </a:tc>
-                <a:tc>
-                  <a:txBody>
-                    <a:bodyPr/>
-                    <a:lstStyle/>
-                    <a:p>
-                      <a:endParaRPr lang="en-IL"/>
-                    </a:p>
-                  </a:txBody>
-                  <a:tcPr/>
-                </a:tc>
-                <a:extLst>
-                  <a:ext uri="{0D108BD9-81ED-4DB2-BD59-A6C34878D82A}">
-                    <a16:rowId xmlns:a16="http://schemas.microsoft.com/office/drawing/2014/main" val="2594430308"/>
-                  </a:ext>
-                </a:extLst>
-              </a:tr>
-              <a:tr h="370840">
-                <a:tc>
-                  <a:txBody>
-                    <a:bodyPr/>
-                    <a:lstStyle/>
-                    <a:p>
-                      <a:endParaRPr lang="en-IL"/>
-                    </a:p>
-                  </a:txBody>
-                  <a:tcPr/>
-                </a:tc>
+              <a:tr h="419183">
                 <a:tc>
                   <a:txBody>
                     <a:bodyPr/>
@@ -4864,6 +4695,311 @@
                   </a:txBody>
                   <a:tcPr/>
                 </a:tc>
+                <a:tc>
+                  <a:txBody>
+                    <a:bodyPr/>
+                    <a:lstStyle/>
+                    <a:p>
+                      <a:r>
+                        <a:rPr lang="he-IL" sz="1000" dirty="0"/>
+                        <a:t>הטבלה של האשראי</a:t>
+                      </a:r>
+                      <a:endParaRPr lang="en-IL" sz="1000" dirty="0"/>
+                    </a:p>
+                  </a:txBody>
+                  <a:tcPr/>
+                </a:tc>
+                <a:extLst>
+                  <a:ext uri="{0D108BD9-81ED-4DB2-BD59-A6C34878D82A}">
+                    <a16:rowId xmlns:a16="http://schemas.microsoft.com/office/drawing/2014/main" val="2292436567"/>
+                  </a:ext>
+                </a:extLst>
+              </a:tr>
+              <a:tr h="392312">
+                <a:tc>
+                  <a:txBody>
+                    <a:bodyPr/>
+                    <a:lstStyle/>
+                    <a:p>
+                      <a:endParaRPr lang="en-IL"/>
+                    </a:p>
+                  </a:txBody>
+                  <a:tcPr/>
+                </a:tc>
+                <a:tc>
+                  <a:txBody>
+                    <a:bodyPr/>
+                    <a:lstStyle/>
+                    <a:p>
+                      <a:endParaRPr lang="en-IL"/>
+                    </a:p>
+                  </a:txBody>
+                  <a:tcPr/>
+                </a:tc>
+                <a:tc>
+                  <a:txBody>
+                    <a:bodyPr/>
+                    <a:lstStyle/>
+                    <a:p>
+                      <a:endParaRPr lang="en-IL"/>
+                    </a:p>
+                  </a:txBody>
+                  <a:tcPr/>
+                </a:tc>
+                <a:tc>
+                  <a:txBody>
+                    <a:bodyPr/>
+                    <a:lstStyle/>
+                    <a:p>
+                      <a:endParaRPr lang="en-IL"/>
+                    </a:p>
+                  </a:txBody>
+                  <a:tcPr/>
+                </a:tc>
+                <a:tc>
+                  <a:txBody>
+                    <a:bodyPr/>
+                    <a:lstStyle/>
+                    <a:p>
+                      <a:endParaRPr lang="en-IL"/>
+                    </a:p>
+                  </a:txBody>
+                  <a:tcPr/>
+                </a:tc>
+                <a:tc>
+                  <a:txBody>
+                    <a:bodyPr/>
+                    <a:lstStyle/>
+                    <a:p>
+                      <a:endParaRPr lang="en-IL" dirty="0"/>
+                    </a:p>
+                  </a:txBody>
+                  <a:tcPr/>
+                </a:tc>
+                <a:tc>
+                  <a:txBody>
+                    <a:bodyPr/>
+                    <a:lstStyle/>
+                    <a:p>
+                      <a:endParaRPr lang="en-IL"/>
+                    </a:p>
+                  </a:txBody>
+                  <a:tcPr/>
+                </a:tc>
+                <a:tc>
+                  <a:txBody>
+                    <a:bodyPr/>
+                    <a:lstStyle/>
+                    <a:p>
+                      <a:endParaRPr lang="en-IL"/>
+                    </a:p>
+                  </a:txBody>
+                  <a:tcPr/>
+                </a:tc>
+                <a:tc>
+                  <a:txBody>
+                    <a:bodyPr/>
+                    <a:lstStyle/>
+                    <a:p>
+                      <a:endParaRPr lang="en-IL"/>
+                    </a:p>
+                  </a:txBody>
+                  <a:tcPr/>
+                </a:tc>
+                <a:extLst>
+                  <a:ext uri="{0D108BD9-81ED-4DB2-BD59-A6C34878D82A}">
+                    <a16:rowId xmlns:a16="http://schemas.microsoft.com/office/drawing/2014/main" val="1769647751"/>
+                  </a:ext>
+                </a:extLst>
+              </a:tr>
+              <a:tr h="392312">
+                <a:tc>
+                  <a:txBody>
+                    <a:bodyPr/>
+                    <a:lstStyle/>
+                    <a:p>
+                      <a:endParaRPr lang="en-IL"/>
+                    </a:p>
+                  </a:txBody>
+                  <a:tcPr/>
+                </a:tc>
+                <a:tc>
+                  <a:txBody>
+                    <a:bodyPr/>
+                    <a:lstStyle/>
+                    <a:p>
+                      <a:endParaRPr lang="en-IL" dirty="0"/>
+                    </a:p>
+                  </a:txBody>
+                  <a:tcPr/>
+                </a:tc>
+                <a:tc>
+                  <a:txBody>
+                    <a:bodyPr/>
+                    <a:lstStyle/>
+                    <a:p>
+                      <a:endParaRPr lang="en-IL" dirty="0"/>
+                    </a:p>
+                  </a:txBody>
+                  <a:tcPr/>
+                </a:tc>
+                <a:tc>
+                  <a:txBody>
+                    <a:bodyPr/>
+                    <a:lstStyle/>
+                    <a:p>
+                      <a:endParaRPr lang="en-IL" dirty="0"/>
+                    </a:p>
+                  </a:txBody>
+                  <a:tcPr/>
+                </a:tc>
+                <a:tc>
+                  <a:txBody>
+                    <a:bodyPr/>
+                    <a:lstStyle/>
+                    <a:p>
+                      <a:endParaRPr lang="en-IL"/>
+                    </a:p>
+                  </a:txBody>
+                  <a:tcPr/>
+                </a:tc>
+                <a:tc>
+                  <a:txBody>
+                    <a:bodyPr/>
+                    <a:lstStyle/>
+                    <a:p>
+                      <a:endParaRPr lang="en-IL"/>
+                    </a:p>
+                  </a:txBody>
+                  <a:tcPr/>
+                </a:tc>
+                <a:tc>
+                  <a:txBody>
+                    <a:bodyPr/>
+                    <a:lstStyle/>
+                    <a:p>
+                      <a:endParaRPr lang="en-IL"/>
+                    </a:p>
+                  </a:txBody>
+                  <a:tcPr/>
+                </a:tc>
+                <a:tc>
+                  <a:txBody>
+                    <a:bodyPr/>
+                    <a:lstStyle/>
+                    <a:p>
+                      <a:endParaRPr lang="en-IL" dirty="0"/>
+                    </a:p>
+                  </a:txBody>
+                  <a:tcPr/>
+                </a:tc>
+                <a:tc>
+                  <a:txBody>
+                    <a:bodyPr/>
+                    <a:lstStyle/>
+                    <a:p>
+                      <a:endParaRPr lang="en-IL"/>
+                    </a:p>
+                  </a:txBody>
+                  <a:tcPr/>
+                </a:tc>
+                <a:extLst>
+                  <a:ext uri="{0D108BD9-81ED-4DB2-BD59-A6C34878D82A}">
+                    <a16:rowId xmlns:a16="http://schemas.microsoft.com/office/drawing/2014/main" val="2594430308"/>
+                  </a:ext>
+                </a:extLst>
+              </a:tr>
+              <a:tr h="392312">
+                <a:tc>
+                  <a:txBody>
+                    <a:bodyPr/>
+                    <a:lstStyle/>
+                    <a:p>
+                      <a:endParaRPr lang="en-IL"/>
+                    </a:p>
+                  </a:txBody>
+                  <a:tcPr/>
+                </a:tc>
+                <a:tc>
+                  <a:txBody>
+                    <a:bodyPr/>
+                    <a:lstStyle/>
+                    <a:p>
+                      <a:endParaRPr lang="en-IL"/>
+                    </a:p>
+                  </a:txBody>
+                  <a:tcPr/>
+                </a:tc>
+                <a:tc>
+                  <a:txBody>
+                    <a:bodyPr/>
+                    <a:lstStyle/>
+                    <a:p>
+                      <a:endParaRPr lang="en-IL"/>
+                    </a:p>
+                  </a:txBody>
+                  <a:tcPr/>
+                </a:tc>
+                <a:tc>
+                  <a:txBody>
+                    <a:bodyPr/>
+                    <a:lstStyle/>
+                    <a:p>
+                      <a:endParaRPr lang="en-IL"/>
+                    </a:p>
+                  </a:txBody>
+                  <a:tcPr/>
+                </a:tc>
+                <a:tc>
+                  <a:txBody>
+                    <a:bodyPr/>
+                    <a:lstStyle/>
+                    <a:p>
+                      <a:endParaRPr lang="en-IL"/>
+                    </a:p>
+                  </a:txBody>
+                  <a:tcPr/>
+                </a:tc>
+                <a:tc>
+                  <a:txBody>
+                    <a:bodyPr/>
+                    <a:lstStyle/>
+                    <a:p>
+                      <a:endParaRPr lang="en-IL"/>
+                    </a:p>
+                  </a:txBody>
+                  <a:tcPr/>
+                </a:tc>
+                <a:tc>
+                  <a:txBody>
+                    <a:bodyPr/>
+                    <a:lstStyle/>
+                    <a:p>
+                      <a:endParaRPr lang="en-IL"/>
+                    </a:p>
+                  </a:txBody>
+                  <a:tcPr/>
+                </a:tc>
+                <a:tc>
+                  <a:txBody>
+                    <a:bodyPr/>
+                    <a:lstStyle/>
+                    <a:p>
+                      <a:endParaRPr lang="en-IL" dirty="0"/>
+                    </a:p>
+                  </a:txBody>
+                  <a:tcPr/>
+                </a:tc>
+                <a:tc>
+                  <a:txBody>
+                    <a:bodyPr/>
+                    <a:lstStyle/>
+                    <a:p>
+                      <a:endParaRPr lang="en-IL" dirty="0"/>
+                    </a:p>
+                  </a:txBody>
+                  <a:tcPr/>
+                </a:tc>
                 <a:extLst>
                   <a:ext uri="{0D108BD9-81ED-4DB2-BD59-A6C34878D82A}">
                     <a16:rowId xmlns:a16="http://schemas.microsoft.com/office/drawing/2014/main" val="2007912289"/>
@@ -4876,10 +5012,10 @@
       </p:graphicFrame>
       <p:sp>
         <p:nvSpPr>
-          <p:cNvPr id="10" name="Rectangle 9">
-            <a:extLst>
-              <a:ext uri="{FF2B5EF4-FFF2-40B4-BE49-F238E27FC236}">
-                <a16:creationId xmlns:a16="http://schemas.microsoft.com/office/drawing/2014/main" id="{5D705BA1-F01C-4A14-A612-DF8350296DFD}"/>
+          <p:cNvPr id="11" name="Rectangle 10">
+            <a:extLst>
+              <a:ext uri="{FF2B5EF4-FFF2-40B4-BE49-F238E27FC236}">
+                <a16:creationId xmlns:a16="http://schemas.microsoft.com/office/drawing/2014/main" id="{78F575C6-73B2-4EAB-93E0-22C9EC8E526F}"/>
               </a:ext>
             </a:extLst>
           </p:cNvPr>
@@ -4922,20 +5058,643 @@
           </a:p>
         </p:txBody>
       </p:sp>
+      <p:sp>
+        <p:nvSpPr>
+          <p:cNvPr id="19" name="Rectangle 18">
+            <a:extLst>
+              <a:ext uri="{FF2B5EF4-FFF2-40B4-BE49-F238E27FC236}">
+                <a16:creationId xmlns:a16="http://schemas.microsoft.com/office/drawing/2014/main" id="{8EF2E095-14DE-4EA8-B889-9F54E0CED701}"/>
+              </a:ext>
+            </a:extLst>
+          </p:cNvPr>
+          <p:cNvSpPr/>
+          <p:nvPr/>
+        </p:nvSpPr>
+        <p:spPr>
+          <a:xfrm>
+            <a:off x="1245054" y="620484"/>
+            <a:ext cx="1187903" cy="302078"/>
+          </a:xfrm>
+          <a:prstGeom prst="rect">
+            <a:avLst/>
+          </a:prstGeom>
+        </p:spPr>
+        <p:style>
+          <a:lnRef idx="2">
+            <a:schemeClr val="dk1"/>
+          </a:lnRef>
+          <a:fillRef idx="1">
+            <a:schemeClr val="lt1"/>
+          </a:fillRef>
+          <a:effectRef idx="0">
+            <a:schemeClr val="dk1"/>
+          </a:effectRef>
+          <a:fontRef idx="minor">
+            <a:schemeClr val="dk1"/>
+          </a:fontRef>
+        </p:style>
+        <p:txBody>
+          <a:bodyPr rtlCol="0" anchor="ctr"/>
+          <a:lstStyle/>
+          <a:p>
+            <a:r>
+              <a:rPr lang="en-US" dirty="0" err="1"/>
+              <a:t>fl</a:t>
+            </a:r>
+            <a:r>
+              <a:rPr lang="en-US" dirty="0"/>
+              <a:t>     </a:t>
+            </a:r>
+            <a:r>
+              <a:rPr lang="en-US" dirty="0" err="1"/>
+              <a:t>wer</a:t>
+            </a:r>
+            <a:endParaRPr lang="en-IL" dirty="0"/>
+          </a:p>
+        </p:txBody>
+      </p:sp>
+      <p:sp>
+        <p:nvSpPr>
+          <p:cNvPr id="21" name="Rectangle 20">
+            <a:extLst>
+              <a:ext uri="{FF2B5EF4-FFF2-40B4-BE49-F238E27FC236}">
+                <a16:creationId xmlns:a16="http://schemas.microsoft.com/office/drawing/2014/main" id="{6FE0E924-C2AE-47A1-A5C8-68125026AA34}"/>
+              </a:ext>
+            </a:extLst>
+          </p:cNvPr>
+          <p:cNvSpPr/>
+          <p:nvPr/>
+        </p:nvSpPr>
+        <p:spPr>
+          <a:xfrm>
+            <a:off x="10621737" y="600072"/>
+            <a:ext cx="922565" cy="302078"/>
+          </a:xfrm>
+          <a:prstGeom prst="rect">
+            <a:avLst/>
+          </a:prstGeom>
+        </p:spPr>
+        <p:style>
+          <a:lnRef idx="2">
+            <a:schemeClr val="dk1"/>
+          </a:lnRef>
+          <a:fillRef idx="1">
+            <a:schemeClr val="lt1"/>
+          </a:fillRef>
+          <a:effectRef idx="0">
+            <a:schemeClr val="dk1"/>
+          </a:effectRef>
+          <a:fontRef idx="minor">
+            <a:schemeClr val="dk1"/>
+          </a:fontRef>
+        </p:style>
+        <p:txBody>
+          <a:bodyPr rtlCol="0" anchor="ctr"/>
+          <a:lstStyle/>
+          <a:p>
+            <a:pPr algn="ctr"/>
+            <a:r>
+              <a:rPr lang="en-US" dirty="0"/>
+              <a:t>menu</a:t>
+            </a:r>
+            <a:endParaRPr lang="en-IL" dirty="0"/>
+          </a:p>
+        </p:txBody>
+      </p:sp>
+      <p:pic>
+        <p:nvPicPr>
+          <p:cNvPr id="25" name="Picture 24">
+            <a:extLst>
+              <a:ext uri="{FF2B5EF4-FFF2-40B4-BE49-F238E27FC236}">
+                <a16:creationId xmlns:a16="http://schemas.microsoft.com/office/drawing/2014/main" id="{5F6BF8A1-5026-4B44-BA7A-2DF713D046CB}"/>
+              </a:ext>
+            </a:extLst>
+          </p:cNvPr>
+          <p:cNvPicPr>
+            <a:picLocks noChangeAspect="1"/>
+          </p:cNvPicPr>
+          <p:nvPr/>
+        </p:nvPicPr>
+        <p:blipFill>
+          <a:blip r:embed="rId2"/>
+          <a:stretch>
+            <a:fillRect/>
+          </a:stretch>
+        </p:blipFill>
+        <p:spPr>
+          <a:xfrm>
+            <a:off x="1459885" y="670865"/>
+            <a:ext cx="243792" cy="219531"/>
+          </a:xfrm>
+          <a:prstGeom prst="rect">
+            <a:avLst/>
+          </a:prstGeom>
+        </p:spPr>
+      </p:pic>
+      <p:graphicFrame>
+        <p:nvGraphicFramePr>
+          <p:cNvPr id="30" name="Table 30">
+            <a:extLst>
+              <a:ext uri="{FF2B5EF4-FFF2-40B4-BE49-F238E27FC236}">
+                <a16:creationId xmlns:a16="http://schemas.microsoft.com/office/drawing/2014/main" id="{26AC02B9-DAB4-4E1E-9BB5-7303EE2543E0}"/>
+              </a:ext>
+            </a:extLst>
+          </p:cNvPr>
+          <p:cNvGraphicFramePr>
+            <a:graphicFrameLocks noGrp="1"/>
+          </p:cNvGraphicFramePr>
+          <p:nvPr>
+            <p:extLst>
+              <p:ext uri="{D42A27DB-BD31-4B8C-83A1-F6EECF244321}">
+                <p14:modId xmlns:p14="http://schemas.microsoft.com/office/powerpoint/2010/main" val="3295136751"/>
+              </p:ext>
+            </p:extLst>
+          </p:nvPr>
+        </p:nvGraphicFramePr>
+        <p:xfrm>
+          <a:off x="10617654" y="963975"/>
+          <a:ext cx="922565" cy="1511632"/>
+        </p:xfrm>
+        <a:graphic>
+          <a:graphicData uri="http://schemas.openxmlformats.org/drawingml/2006/table">
+            <a:tbl>
+              <a:tblPr firstRow="1" bandRow="1">
+                <a:tableStyleId>{2D5ABB26-0587-4C30-8999-92F81FD0307C}</a:tableStyleId>
+              </a:tblPr>
+              <a:tblGrid>
+                <a:gridCol w="922565">
+                  <a:extLst>
+                    <a:ext uri="{9D8B030D-6E8A-4147-A177-3AD203B41FA5}">
+                      <a16:colId xmlns:a16="http://schemas.microsoft.com/office/drawing/2014/main" val="3554551862"/>
+                    </a:ext>
+                  </a:extLst>
+                </a:gridCol>
+              </a:tblGrid>
+              <a:tr h="396526">
+                <a:tc>
+                  <a:txBody>
+                    <a:bodyPr/>
+                    <a:lstStyle/>
+                    <a:p>
+                      <a:pPr algn="ctr"/>
+                      <a:r>
+                        <a:rPr lang="en-US" sz="1100" dirty="0"/>
+                        <a:t>Add csv</a:t>
+                      </a:r>
+                      <a:endParaRPr lang="en-US" dirty="0"/>
+                    </a:p>
+                  </a:txBody>
+                  <a:tcPr anchor="ctr">
+                    <a:lnL w="12700" cap="flat" cmpd="sng" algn="ctr">
+                      <a:solidFill>
+                        <a:schemeClr val="tx1"/>
+                      </a:solidFill>
+                      <a:prstDash val="solid"/>
+                      <a:round/>
+                      <a:headEnd type="none" w="med" len="med"/>
+                      <a:tailEnd type="none" w="med" len="med"/>
+                    </a:lnL>
+                    <a:lnR w="12700" cap="flat" cmpd="sng" algn="ctr">
+                      <a:solidFill>
+                        <a:schemeClr val="tx1"/>
+                      </a:solidFill>
+                      <a:prstDash val="solid"/>
+                      <a:round/>
+                      <a:headEnd type="none" w="med" len="med"/>
+                      <a:tailEnd type="none" w="med" len="med"/>
+                    </a:lnR>
+                    <a:lnT w="12700" cap="flat" cmpd="sng" algn="ctr">
+                      <a:solidFill>
+                        <a:schemeClr val="tx1"/>
+                      </a:solidFill>
+                      <a:prstDash val="solid"/>
+                      <a:round/>
+                      <a:headEnd type="none" w="med" len="med"/>
+                      <a:tailEnd type="none" w="med" len="med"/>
+                    </a:lnT>
+                    <a:lnB w="12700" cap="flat" cmpd="sng" algn="ctr">
+                      <a:solidFill>
+                        <a:schemeClr val="tx1"/>
+                      </a:solidFill>
+                      <a:prstDash val="solid"/>
+                      <a:round/>
+                      <a:headEnd type="none" w="med" len="med"/>
+                      <a:tailEnd type="none" w="med" len="med"/>
+                    </a:lnB>
+                    <a:lnTlToBr w="12700" cmpd="sng">
+                      <a:noFill/>
+                      <a:prstDash val="solid"/>
+                    </a:lnTlToBr>
+                    <a:lnBlToTr w="12700" cmpd="sng">
+                      <a:noFill/>
+                      <a:prstDash val="solid"/>
+                    </a:lnBlToTr>
+                  </a:tcPr>
+                </a:tc>
+                <a:extLst>
+                  <a:ext uri="{0D108BD9-81ED-4DB2-BD59-A6C34878D82A}">
+                    <a16:rowId xmlns:a16="http://schemas.microsoft.com/office/drawing/2014/main" val="2696887319"/>
+                  </a:ext>
+                </a:extLst>
+              </a:tr>
+              <a:tr h="224971">
+                <a:tc>
+                  <a:txBody>
+                    <a:bodyPr/>
+                    <a:lstStyle/>
+                    <a:p>
+                      <a:endParaRPr lang="en-IL" dirty="0"/>
+                    </a:p>
+                  </a:txBody>
+                  <a:tcPr>
+                    <a:lnL w="12700" cap="flat" cmpd="sng" algn="ctr">
+                      <a:solidFill>
+                        <a:schemeClr val="tx1"/>
+                      </a:solidFill>
+                      <a:prstDash val="solid"/>
+                      <a:round/>
+                      <a:headEnd type="none" w="med" len="med"/>
+                      <a:tailEnd type="none" w="med" len="med"/>
+                    </a:lnL>
+                    <a:lnR w="12700" cap="flat" cmpd="sng" algn="ctr">
+                      <a:solidFill>
+                        <a:schemeClr val="tx1"/>
+                      </a:solidFill>
+                      <a:prstDash val="solid"/>
+                      <a:round/>
+                      <a:headEnd type="none" w="med" len="med"/>
+                      <a:tailEnd type="none" w="med" len="med"/>
+                    </a:lnR>
+                    <a:lnT w="12700" cap="flat" cmpd="sng" algn="ctr">
+                      <a:solidFill>
+                        <a:schemeClr val="tx1"/>
+                      </a:solidFill>
+                      <a:prstDash val="solid"/>
+                      <a:round/>
+                      <a:headEnd type="none" w="med" len="med"/>
+                      <a:tailEnd type="none" w="med" len="med"/>
+                    </a:lnT>
+                    <a:lnB w="12700" cap="flat" cmpd="sng" algn="ctr">
+                      <a:solidFill>
+                        <a:schemeClr val="tx1"/>
+                      </a:solidFill>
+                      <a:prstDash val="solid"/>
+                      <a:round/>
+                      <a:headEnd type="none" w="med" len="med"/>
+                      <a:tailEnd type="none" w="med" len="med"/>
+                    </a:lnB>
+                    <a:lnTlToBr w="12700" cmpd="sng">
+                      <a:noFill/>
+                      <a:prstDash val="solid"/>
+                    </a:lnTlToBr>
+                    <a:lnBlToTr w="12700" cmpd="sng">
+                      <a:noFill/>
+                      <a:prstDash val="solid"/>
+                    </a:lnBlToTr>
+                  </a:tcPr>
+                </a:tc>
+                <a:extLst>
+                  <a:ext uri="{0D108BD9-81ED-4DB2-BD59-A6C34878D82A}">
+                    <a16:rowId xmlns:a16="http://schemas.microsoft.com/office/drawing/2014/main" val="1516322494"/>
+                  </a:ext>
+                </a:extLst>
+              </a:tr>
+              <a:tr h="383586">
+                <a:tc>
+                  <a:txBody>
+                    <a:bodyPr/>
+                    <a:lstStyle/>
+                    <a:p>
+                      <a:endParaRPr lang="en-IL" dirty="0"/>
+                    </a:p>
+                  </a:txBody>
+                  <a:tcPr>
+                    <a:lnL w="12700" cap="flat" cmpd="sng" algn="ctr">
+                      <a:solidFill>
+                        <a:schemeClr val="tx1"/>
+                      </a:solidFill>
+                      <a:prstDash val="solid"/>
+                      <a:round/>
+                      <a:headEnd type="none" w="med" len="med"/>
+                      <a:tailEnd type="none" w="med" len="med"/>
+                    </a:lnL>
+                    <a:lnR w="12700" cap="flat" cmpd="sng" algn="ctr">
+                      <a:solidFill>
+                        <a:schemeClr val="tx1"/>
+                      </a:solidFill>
+                      <a:prstDash val="solid"/>
+                      <a:round/>
+                      <a:headEnd type="none" w="med" len="med"/>
+                      <a:tailEnd type="none" w="med" len="med"/>
+                    </a:lnR>
+                    <a:lnT w="12700" cap="flat" cmpd="sng" algn="ctr">
+                      <a:solidFill>
+                        <a:schemeClr val="tx1"/>
+                      </a:solidFill>
+                      <a:prstDash val="solid"/>
+                      <a:round/>
+                      <a:headEnd type="none" w="med" len="med"/>
+                      <a:tailEnd type="none" w="med" len="med"/>
+                    </a:lnT>
+                    <a:lnB w="12700" cap="flat" cmpd="sng" algn="ctr">
+                      <a:solidFill>
+                        <a:schemeClr val="tx1"/>
+                      </a:solidFill>
+                      <a:prstDash val="solid"/>
+                      <a:round/>
+                      <a:headEnd type="none" w="med" len="med"/>
+                      <a:tailEnd type="none" w="med" len="med"/>
+                    </a:lnB>
+                    <a:lnTlToBr w="12700" cmpd="sng">
+                      <a:noFill/>
+                      <a:prstDash val="solid"/>
+                    </a:lnTlToBr>
+                    <a:lnBlToTr w="12700" cmpd="sng">
+                      <a:noFill/>
+                      <a:prstDash val="solid"/>
+                    </a:lnBlToTr>
+                  </a:tcPr>
+                </a:tc>
+                <a:extLst>
+                  <a:ext uri="{0D108BD9-81ED-4DB2-BD59-A6C34878D82A}">
+                    <a16:rowId xmlns:a16="http://schemas.microsoft.com/office/drawing/2014/main" val="2491914848"/>
+                  </a:ext>
+                </a:extLst>
+              </a:tr>
+              <a:tr h="172005">
+                <a:tc>
+                  <a:txBody>
+                    <a:bodyPr/>
+                    <a:lstStyle/>
+                    <a:p>
+                      <a:endParaRPr lang="en-IL" dirty="0"/>
+                    </a:p>
+                  </a:txBody>
+                  <a:tcPr>
+                    <a:lnL w="12700" cap="flat" cmpd="sng" algn="ctr">
+                      <a:solidFill>
+                        <a:schemeClr val="tx1"/>
+                      </a:solidFill>
+                      <a:prstDash val="solid"/>
+                      <a:round/>
+                      <a:headEnd type="none" w="med" len="med"/>
+                      <a:tailEnd type="none" w="med" len="med"/>
+                    </a:lnL>
+                    <a:lnR w="12700" cap="flat" cmpd="sng" algn="ctr">
+                      <a:solidFill>
+                        <a:schemeClr val="tx1"/>
+                      </a:solidFill>
+                      <a:prstDash val="solid"/>
+                      <a:round/>
+                      <a:headEnd type="none" w="med" len="med"/>
+                      <a:tailEnd type="none" w="med" len="med"/>
+                    </a:lnR>
+                    <a:lnT w="12700" cap="flat" cmpd="sng" algn="ctr">
+                      <a:solidFill>
+                        <a:schemeClr val="tx1"/>
+                      </a:solidFill>
+                      <a:prstDash val="solid"/>
+                      <a:round/>
+                      <a:headEnd type="none" w="med" len="med"/>
+                      <a:tailEnd type="none" w="med" len="med"/>
+                    </a:lnT>
+                    <a:lnB w="12700" cap="flat" cmpd="sng" algn="ctr">
+                      <a:solidFill>
+                        <a:schemeClr val="tx1"/>
+                      </a:solidFill>
+                      <a:prstDash val="solid"/>
+                      <a:round/>
+                      <a:headEnd type="none" w="med" len="med"/>
+                      <a:tailEnd type="none" w="med" len="med"/>
+                    </a:lnB>
+                    <a:lnTlToBr w="12700" cmpd="sng">
+                      <a:noFill/>
+                      <a:prstDash val="solid"/>
+                    </a:lnTlToBr>
+                    <a:lnBlToTr w="12700" cmpd="sng">
+                      <a:noFill/>
+                      <a:prstDash val="solid"/>
+                    </a:lnBlToTr>
+                  </a:tcPr>
+                </a:tc>
+                <a:extLst>
+                  <a:ext uri="{0D108BD9-81ED-4DB2-BD59-A6C34878D82A}">
+                    <a16:rowId xmlns:a16="http://schemas.microsoft.com/office/drawing/2014/main" val="3624019121"/>
+                  </a:ext>
+                </a:extLst>
+              </a:tr>
+            </a:tbl>
+          </a:graphicData>
+        </a:graphic>
+      </p:graphicFrame>
     </p:spTree>
     <p:extLst>
       <p:ext uri="{BB962C8B-B14F-4D97-AF65-F5344CB8AC3E}">
-        <p14:creationId xmlns:p14="http://schemas.microsoft.com/office/powerpoint/2010/main" val="88507329"/>
+        <p14:creationId xmlns:p14="http://schemas.microsoft.com/office/powerpoint/2010/main" val="1160351250"/>
       </p:ext>
     </p:extLst>
   </p:cSld>
   <p:clrMapOvr>
     <a:masterClrMapping/>
   </p:clrMapOvr>
+  <p:transition spd="slow">
+    <p:push dir="u"/>
+  </p:transition>
+  <p:timing>
+    <p:tnLst>
+      <p:par>
+        <p:cTn id="1" dur="indefinite" restart="never" nodeType="tmRoot">
+          <p:childTnLst>
+            <p:seq concurrent="1" nextAc="seek">
+              <p:cTn id="2" restart="whenNotActive" fill="hold" evtFilter="cancelBubble" nodeType="interactiveSeq">
+                <p:stCondLst>
+                  <p:cond evt="onClick" delay="0">
+                    <p:tgtEl>
+                      <p:spTgt spid="21"/>
+                    </p:tgtEl>
+                  </p:cond>
+                </p:stCondLst>
+                <p:endSync evt="end" delay="0">
+                  <p:rtn val="all"/>
+                </p:endSync>
+                <p:childTnLst>
+                  <p:par>
+                    <p:cTn id="3" fill="hold">
+                      <p:stCondLst>
+                        <p:cond delay="0"/>
+                      </p:stCondLst>
+                      <p:childTnLst>
+                        <p:par>
+                          <p:cTn id="4" fill="hold">
+                            <p:stCondLst>
+                              <p:cond delay="0"/>
+                            </p:stCondLst>
+                            <p:childTnLst>
+                              <p:par>
+                                <p:cTn id="5" presetID="1" presetClass="entr" presetSubtype="0" fill="hold" nodeType="clickEffect">
+                                  <p:stCondLst>
+                                    <p:cond delay="0"/>
+                                  </p:stCondLst>
+                                  <p:childTnLst>
+                                    <p:set>
+                                      <p:cBhvr>
+                                        <p:cTn id="6" dur="1" fill="hold">
+                                          <p:stCondLst>
+                                            <p:cond delay="0"/>
+                                          </p:stCondLst>
+                                        </p:cTn>
+                                        <p:tgtEl>
+                                          <p:spTgt spid="30"/>
+                                        </p:tgtEl>
+                                        <p:attrNameLst>
+                                          <p:attrName>style.visibility</p:attrName>
+                                        </p:attrNameLst>
+                                      </p:cBhvr>
+                                      <p:to>
+                                        <p:strVal val="visible"/>
+                                      </p:to>
+                                    </p:set>
+                                  </p:childTnLst>
+                                </p:cTn>
+                              </p:par>
+                            </p:childTnLst>
+                          </p:cTn>
+                        </p:par>
+                      </p:childTnLst>
+                    </p:cTn>
+                  </p:par>
+                  <p:par>
+                    <p:cTn id="7" fill="hold">
+                      <p:stCondLst>
+                        <p:cond delay="indefinite"/>
+                      </p:stCondLst>
+                      <p:childTnLst>
+                        <p:par>
+                          <p:cTn id="8" fill="hold">
+                            <p:stCondLst>
+                              <p:cond delay="0"/>
+                            </p:stCondLst>
+                            <p:childTnLst>
+                              <p:par>
+                                <p:cTn id="9" presetID="1" presetClass="exit" presetSubtype="0" fill="hold" nodeType="clickEffect">
+                                  <p:stCondLst>
+                                    <p:cond delay="0"/>
+                                  </p:stCondLst>
+                                  <p:childTnLst>
+                                    <p:set>
+                                      <p:cBhvr>
+                                        <p:cTn id="10" dur="1" fill="hold">
+                                          <p:stCondLst>
+                                            <p:cond delay="0"/>
+                                          </p:stCondLst>
+                                        </p:cTn>
+                                        <p:tgtEl>
+                                          <p:spTgt spid="30"/>
+                                        </p:tgtEl>
+                                        <p:attrNameLst>
+                                          <p:attrName>style.visibility</p:attrName>
+                                        </p:attrNameLst>
+                                      </p:cBhvr>
+                                      <p:to>
+                                        <p:strVal val="hidden"/>
+                                      </p:to>
+                                    </p:set>
+                                  </p:childTnLst>
+                                </p:cTn>
+                              </p:par>
+                            </p:childTnLst>
+                          </p:cTn>
+                        </p:par>
+                      </p:childTnLst>
+                    </p:cTn>
+                  </p:par>
+                </p:childTnLst>
+              </p:cTn>
+              <p:nextCondLst>
+                <p:cond evt="onClick" delay="0">
+                  <p:tgtEl>
+                    <p:spTgt spid="21"/>
+                  </p:tgtEl>
+                </p:cond>
+              </p:nextCondLst>
+            </p:seq>
+            <p:seq concurrent="1" nextAc="seek">
+              <p:cTn id="11" restart="whenNotActive" fill="hold" evtFilter="cancelBubble" nodeType="interactiveSeq">
+                <p:stCondLst>
+                  <p:cond evt="onClick" delay="0">
+                    <p:tgtEl>
+                      <p:spTgt spid="30"/>
+                    </p:tgtEl>
+                  </p:cond>
+                </p:stCondLst>
+                <p:endSync evt="end" delay="0">
+                  <p:rtn val="all"/>
+                </p:endSync>
+                <p:childTnLst>
+                  <p:par>
+                    <p:cTn id="12" fill="hold">
+                      <p:stCondLst>
+                        <p:cond delay="0"/>
+                      </p:stCondLst>
+                      <p:childTnLst>
+                        <p:par>
+                          <p:cTn id="13" fill="hold">
+                            <p:stCondLst>
+                              <p:cond delay="0"/>
+                            </p:stCondLst>
+                            <p:childTnLst>
+                              <p:par>
+                                <p:cTn id="14" presetID="1" presetClass="entr" presetSubtype="0" fill="hold" nodeType="clickEffect">
+                                  <p:stCondLst>
+                                    <p:cond delay="0"/>
+                                  </p:stCondLst>
+                                  <p:childTnLst>
+                                    <p:set>
+                                      <p:cBhvr>
+                                        <p:cTn id="15" dur="1" fill="hold">
+                                          <p:stCondLst>
+                                            <p:cond delay="0"/>
+                                          </p:stCondLst>
+                                        </p:cTn>
+                                        <p:tgtEl>
+                                          <p:spTgt spid="9"/>
+                                        </p:tgtEl>
+                                        <p:attrNameLst>
+                                          <p:attrName>style.visibility</p:attrName>
+                                        </p:attrNameLst>
+                                      </p:cBhvr>
+                                      <p:to>
+                                        <p:strVal val="visible"/>
+                                      </p:to>
+                                    </p:set>
+                                  </p:childTnLst>
+                                </p:cTn>
+                              </p:par>
+                            </p:childTnLst>
+                          </p:cTn>
+                        </p:par>
+                      </p:childTnLst>
+                    </p:cTn>
+                  </p:par>
+                </p:childTnLst>
+              </p:cTn>
+              <p:nextCondLst>
+                <p:cond evt="onClick" delay="0">
+                  <p:tgtEl>
+                    <p:spTgt spid="30"/>
+                  </p:tgtEl>
+                </p:cond>
+              </p:nextCondLst>
+            </p:seq>
+          </p:childTnLst>
+        </p:cTn>
+      </p:par>
+    </p:tnLst>
+  </p:timing>
 </p:sld>
 </file>
 
-<file path=ppt/slides/slide2.xml><?xml version="1.0" encoding="utf-8"?>
+<file path=ppt/slides/slide3.xml><?xml version="1.0" encoding="utf-8"?>
 <p:sld xmlns:a="http://schemas.openxmlformats.org/drawingml/2006/main" xmlns:r="http://schemas.openxmlformats.org/officeDocument/2006/relationships" xmlns:p="http://schemas.openxmlformats.org/presentationml/2006/main">
   <p:cSld>
     <p:spTree>
@@ -5488,4 +6247,299 @@
     </a:ext>
   </a:extLst>
 </a:theme>
+</file>
+
+<file path=ppt/theme/theme2.xml><?xml version="1.0" encoding="utf-8"?>
+<a:theme xmlns:a="http://schemas.openxmlformats.org/drawingml/2006/main" name="Office Theme">
+  <a:themeElements>
+    <a:clrScheme name="Office">
+      <a:dk1>
+        <a:sysClr val="windowText" lastClr="000000"/>
+      </a:dk1>
+      <a:lt1>
+        <a:sysClr val="window" lastClr="FFFFFF"/>
+      </a:lt1>
+      <a:dk2>
+        <a:srgbClr val="44546A"/>
+      </a:dk2>
+      <a:lt2>
+        <a:srgbClr val="E7E6E6"/>
+      </a:lt2>
+      <a:accent1>
+        <a:srgbClr val="4472C4"/>
+      </a:accent1>
+      <a:accent2>
+        <a:srgbClr val="ED7D31"/>
+      </a:accent2>
+      <a:accent3>
+        <a:srgbClr val="A5A5A5"/>
+      </a:accent3>
+      <a:accent4>
+        <a:srgbClr val="FFC000"/>
+      </a:accent4>
+      <a:accent5>
+        <a:srgbClr val="5B9BD5"/>
+      </a:accent5>
+      <a:accent6>
+        <a:srgbClr val="70AD47"/>
+      </a:accent6>
+      <a:hlink>
+        <a:srgbClr val="0563C1"/>
+      </a:hlink>
+      <a:folHlink>
+        <a:srgbClr val="954F72"/>
+      </a:folHlink>
+    </a:clrScheme>
+    <a:fontScheme name="Office">
+      <a:majorFont>
+        <a:latin typeface="Calibri Light" panose="020F0302020204030204"/>
+        <a:ea typeface=""/>
+        <a:cs typeface=""/>
+        <a:font script="Jpan" typeface="游ゴシック Light"/>
+        <a:font script="Hang" typeface="맑은 고딕"/>
+        <a:font script="Hans" typeface="等线 Light"/>
+        <a:font script="Hant" typeface="新細明體"/>
+        <a:font script="Arab" typeface="Times New Roman"/>
+        <a:font script="Hebr" typeface="Times New Roman"/>
+        <a:font script="Thai" typeface="Angsana New"/>
+        <a:font script="Ethi" typeface="Nyala"/>
+        <a:font script="Beng" typeface="Vrinda"/>
+        <a:font script="Gujr" typeface="Shruti"/>
+        <a:font script="Khmr" typeface="MoolBoran"/>
+        <a:font script="Knda" typeface="Tunga"/>
+        <a:font script="Guru" typeface="Raavi"/>
+        <a:font script="Cans" typeface="Euphemia"/>
+        <a:font script="Cher" typeface="Plantagenet Cherokee"/>
+        <a:font script="Yiii" typeface="Microsoft Yi Baiti"/>
+        <a:font script="Tibt" typeface="Microsoft Himalaya"/>
+        <a:font script="Thaa" typeface="MV Boli"/>
+        <a:font script="Deva" typeface="Mangal"/>
+        <a:font script="Telu" typeface="Gautami"/>
+        <a:font script="Taml" typeface="Latha"/>
+        <a:font script="Syrc" typeface="Estrangelo Edessa"/>
+        <a:font script="Orya" typeface="Kalinga"/>
+        <a:font script="Mlym" typeface="Kartika"/>
+        <a:font script="Laoo" typeface="DokChampa"/>
+        <a:font script="Sinh" typeface="Iskoola Pota"/>
+        <a:font script="Mong" typeface="Mongolian Baiti"/>
+        <a:font script="Viet" typeface="Times New Roman"/>
+        <a:font script="Uigh" typeface="Microsoft Uighur"/>
+        <a:font script="Geor" typeface="Sylfaen"/>
+        <a:font script="Armn" typeface="Arial"/>
+        <a:font script="Bugi" typeface="Leelawadee UI"/>
+        <a:font script="Bopo" typeface="Microsoft JhengHei"/>
+        <a:font script="Java" typeface="Javanese Text"/>
+        <a:font script="Lisu" typeface="Segoe UI"/>
+        <a:font script="Mymr" typeface="Myanmar Text"/>
+        <a:font script="Nkoo" typeface="Ebrima"/>
+        <a:font script="Olck" typeface="Nirmala UI"/>
+        <a:font script="Osma" typeface="Ebrima"/>
+        <a:font script="Phag" typeface="Phagspa"/>
+        <a:font script="Syrn" typeface="Estrangelo Edessa"/>
+        <a:font script="Syrj" typeface="Estrangelo Edessa"/>
+        <a:font script="Syre" typeface="Estrangelo Edessa"/>
+        <a:font script="Sora" typeface="Nirmala UI"/>
+        <a:font script="Tale" typeface="Microsoft Tai Le"/>
+        <a:font script="Talu" typeface="Microsoft New Tai Lue"/>
+        <a:font script="Tfng" typeface="Ebrima"/>
+      </a:majorFont>
+      <a:minorFont>
+        <a:latin typeface="Calibri" panose="020F0502020204030204"/>
+        <a:ea typeface=""/>
+        <a:cs typeface=""/>
+        <a:font script="Jpan" typeface="游ゴシック"/>
+        <a:font script="Hang" typeface="맑은 고딕"/>
+        <a:font script="Hans" typeface="等线"/>
+        <a:font script="Hant" typeface="新細明體"/>
+        <a:font script="Arab" typeface="Arial"/>
+        <a:font script="Hebr" typeface="Arial"/>
+        <a:font script="Thai" typeface="Cordia New"/>
+        <a:font script="Ethi" typeface="Nyala"/>
+        <a:font script="Beng" typeface="Vrinda"/>
+        <a:font script="Gujr" typeface="Shruti"/>
+        <a:font script="Khmr" typeface="DaunPenh"/>
+        <a:font script="Knda" typeface="Tunga"/>
+        <a:font script="Guru" typeface="Raavi"/>
+        <a:font script="Cans" typeface="Euphemia"/>
+        <a:font script="Cher" typeface="Plantagenet Cherokee"/>
+        <a:font script="Yiii" typeface="Microsoft Yi Baiti"/>
+        <a:font script="Tibt" typeface="Microsoft Himalaya"/>
+        <a:font script="Thaa" typeface="MV Boli"/>
+        <a:font script="Deva" typeface="Mangal"/>
+        <a:font script="Telu" typeface="Gautami"/>
+        <a:font script="Taml" typeface="Latha"/>
+        <a:font script="Syrc" typeface="Estrangelo Edessa"/>
+        <a:font script="Orya" typeface="Kalinga"/>
+        <a:font script="Mlym" typeface="Kartika"/>
+        <a:font script="Laoo" typeface="DokChampa"/>
+        <a:font script="Sinh" typeface="Iskoola Pota"/>
+        <a:font script="Mong" typeface="Mongolian Baiti"/>
+        <a:font script="Viet" typeface="Arial"/>
+        <a:font script="Uigh" typeface="Microsoft Uighur"/>
+        <a:font script="Geor" typeface="Sylfaen"/>
+        <a:font script="Armn" typeface="Arial"/>
+        <a:font script="Bugi" typeface="Leelawadee UI"/>
+        <a:font script="Bopo" typeface="Microsoft JhengHei"/>
+        <a:font script="Java" typeface="Javanese Text"/>
+        <a:font script="Lisu" typeface="Segoe UI"/>
+        <a:font script="Mymr" typeface="Myanmar Text"/>
+        <a:font script="Nkoo" typeface="Ebrima"/>
+        <a:font script="Olck" typeface="Nirmala UI"/>
+        <a:font script="Osma" typeface="Ebrima"/>
+        <a:font script="Phag" typeface="Phagspa"/>
+        <a:font script="Syrn" typeface="Estrangelo Edessa"/>
+        <a:font script="Syrj" typeface="Estrangelo Edessa"/>
+        <a:font script="Syre" typeface="Estrangelo Edessa"/>
+        <a:font script="Sora" typeface="Nirmala UI"/>
+        <a:font script="Tale" typeface="Microsoft Tai Le"/>
+        <a:font script="Talu" typeface="Microsoft New Tai Lue"/>
+        <a:font script="Tfng" typeface="Ebrima"/>
+      </a:minorFont>
+    </a:fontScheme>
+    <a:fmtScheme name="Office">
+      <a:fillStyleLst>
+        <a:solidFill>
+          <a:schemeClr val="phClr"/>
+        </a:solidFill>
+        <a:gradFill rotWithShape="1">
+          <a:gsLst>
+            <a:gs pos="0">
+              <a:schemeClr val="phClr">
+                <a:lumMod val="110000"/>
+                <a:satMod val="105000"/>
+                <a:tint val="67000"/>
+              </a:schemeClr>
+            </a:gs>
+            <a:gs pos="50000">
+              <a:schemeClr val="phClr">
+                <a:lumMod val="105000"/>
+                <a:satMod val="103000"/>
+                <a:tint val="73000"/>
+              </a:schemeClr>
+            </a:gs>
+            <a:gs pos="100000">
+              <a:schemeClr val="phClr">
+                <a:lumMod val="105000"/>
+                <a:satMod val="109000"/>
+                <a:tint val="81000"/>
+              </a:schemeClr>
+            </a:gs>
+          </a:gsLst>
+          <a:lin ang="5400000" scaled="0"/>
+        </a:gradFill>
+        <a:gradFill rotWithShape="1">
+          <a:gsLst>
+            <a:gs pos="0">
+              <a:schemeClr val="phClr">
+                <a:satMod val="103000"/>
+                <a:lumMod val="102000"/>
+                <a:tint val="94000"/>
+              </a:schemeClr>
+            </a:gs>
+            <a:gs pos="50000">
+              <a:schemeClr val="phClr">
+                <a:satMod val="110000"/>
+                <a:lumMod val="100000"/>
+                <a:shade val="100000"/>
+              </a:schemeClr>
+            </a:gs>
+            <a:gs pos="100000">
+              <a:schemeClr val="phClr">
+                <a:lumMod val="99000"/>
+                <a:satMod val="120000"/>
+                <a:shade val="78000"/>
+              </a:schemeClr>
+            </a:gs>
+          </a:gsLst>
+          <a:lin ang="5400000" scaled="0"/>
+        </a:gradFill>
+      </a:fillStyleLst>
+      <a:lnStyleLst>
+        <a:ln w="6350" cap="flat" cmpd="sng" algn="ctr">
+          <a:solidFill>
+            <a:schemeClr val="phClr"/>
+          </a:solidFill>
+          <a:prstDash val="solid"/>
+          <a:miter lim="800000"/>
+        </a:ln>
+        <a:ln w="12700" cap="flat" cmpd="sng" algn="ctr">
+          <a:solidFill>
+            <a:schemeClr val="phClr"/>
+          </a:solidFill>
+          <a:prstDash val="solid"/>
+          <a:miter lim="800000"/>
+        </a:ln>
+        <a:ln w="19050" cap="flat" cmpd="sng" algn="ctr">
+          <a:solidFill>
+            <a:schemeClr val="phClr"/>
+          </a:solidFill>
+          <a:prstDash val="solid"/>
+          <a:miter lim="800000"/>
+        </a:ln>
+      </a:lnStyleLst>
+      <a:effectStyleLst>
+        <a:effectStyle>
+          <a:effectLst/>
+        </a:effectStyle>
+        <a:effectStyle>
+          <a:effectLst/>
+        </a:effectStyle>
+        <a:effectStyle>
+          <a:effectLst>
+            <a:outerShdw blurRad="57150" dist="19050" dir="5400000" algn="ctr" rotWithShape="0">
+              <a:srgbClr val="000000">
+                <a:alpha val="63000"/>
+              </a:srgbClr>
+            </a:outerShdw>
+          </a:effectLst>
+        </a:effectStyle>
+      </a:effectStyleLst>
+      <a:bgFillStyleLst>
+        <a:solidFill>
+          <a:schemeClr val="phClr"/>
+        </a:solidFill>
+        <a:solidFill>
+          <a:schemeClr val="phClr">
+            <a:tint val="95000"/>
+            <a:satMod val="170000"/>
+          </a:schemeClr>
+        </a:solidFill>
+        <a:gradFill rotWithShape="1">
+          <a:gsLst>
+            <a:gs pos="0">
+              <a:schemeClr val="phClr">
+                <a:tint val="93000"/>
+                <a:satMod val="150000"/>
+                <a:shade val="98000"/>
+                <a:lumMod val="102000"/>
+              </a:schemeClr>
+            </a:gs>
+            <a:gs pos="50000">
+              <a:schemeClr val="phClr">
+                <a:tint val="98000"/>
+                <a:satMod val="130000"/>
+                <a:shade val="90000"/>
+                <a:lumMod val="103000"/>
+              </a:schemeClr>
+            </a:gs>
+            <a:gs pos="100000">
+              <a:schemeClr val="phClr">
+                <a:shade val="63000"/>
+                <a:satMod val="120000"/>
+              </a:schemeClr>
+            </a:gs>
+          </a:gsLst>
+          <a:lin ang="5400000" scaled="0"/>
+        </a:gradFill>
+      </a:bgFillStyleLst>
+    </a:fmtScheme>
+  </a:themeElements>
+  <a:objectDefaults/>
+  <a:extraClrSchemeLst/>
+  <a:extLst>
+    <a:ext uri="{05A4C25C-085E-4340-85A3-A5531E510DB2}">
+      <thm15:themeFamily xmlns:thm15="http://schemas.microsoft.com/office/thememl/2012/main" name="Office Theme" id="{62F939B6-93AF-4DB8-9C6B-D6C7DFDC589F}" vid="{4A3C46E8-61CC-4603-A589-7422A47A8E4A}"/>
+    </a:ext>
+  </a:extLst>
+</a:theme>
 </file>
</xml_diff>